<commit_message>
Agregadas pantallas de CUs y actualización ppt2
</commit_message>
<xml_diff>
--- a/Documentos/Presentacion2 - S.G.A.P.pptx
+++ b/Documentos/Presentacion2 - S.G.A.P.pptx
@@ -5,29 +5,46 @@
     <p:sldMasterId id="2147483648" r:id="rId1"/>
   </p:sldMasterIdLst>
   <p:notesMasterIdLst>
-    <p:notesMasterId r:id="rId22"/>
+    <p:notesMasterId r:id="rId39"/>
   </p:notesMasterIdLst>
   <p:sldIdLst>
     <p:sldId id="256" r:id="rId2"/>
     <p:sldId id="257" r:id="rId3"/>
-    <p:sldId id="298" r:id="rId4"/>
-    <p:sldId id="305" r:id="rId5"/>
-    <p:sldId id="308" r:id="rId6"/>
-    <p:sldId id="309" r:id="rId7"/>
-    <p:sldId id="310" r:id="rId8"/>
-    <p:sldId id="300" r:id="rId9"/>
-    <p:sldId id="301" r:id="rId10"/>
-    <p:sldId id="299" r:id="rId11"/>
-    <p:sldId id="311" r:id="rId12"/>
-    <p:sldId id="312" r:id="rId13"/>
-    <p:sldId id="313" r:id="rId14"/>
-    <p:sldId id="314" r:id="rId15"/>
-    <p:sldId id="315" r:id="rId16"/>
-    <p:sldId id="316" r:id="rId17"/>
-    <p:sldId id="317" r:id="rId18"/>
-    <p:sldId id="318" r:id="rId19"/>
-    <p:sldId id="319" r:id="rId20"/>
-    <p:sldId id="320" r:id="rId21"/>
+    <p:sldId id="310" r:id="rId4"/>
+    <p:sldId id="301" r:id="rId5"/>
+    <p:sldId id="300" r:id="rId6"/>
+    <p:sldId id="299" r:id="rId7"/>
+    <p:sldId id="298" r:id="rId8"/>
+    <p:sldId id="305" r:id="rId9"/>
+    <p:sldId id="322" r:id="rId10"/>
+    <p:sldId id="321" r:id="rId11"/>
+    <p:sldId id="323" r:id="rId12"/>
+    <p:sldId id="324" r:id="rId13"/>
+    <p:sldId id="325" r:id="rId14"/>
+    <p:sldId id="326" r:id="rId15"/>
+    <p:sldId id="308" r:id="rId16"/>
+    <p:sldId id="327" r:id="rId17"/>
+    <p:sldId id="328" r:id="rId18"/>
+    <p:sldId id="329" r:id="rId19"/>
+    <p:sldId id="330" r:id="rId20"/>
+    <p:sldId id="309" r:id="rId21"/>
+    <p:sldId id="331" r:id="rId22"/>
+    <p:sldId id="332" r:id="rId23"/>
+    <p:sldId id="335" r:id="rId24"/>
+    <p:sldId id="333" r:id="rId25"/>
+    <p:sldId id="334" r:id="rId26"/>
+    <p:sldId id="336" r:id="rId27"/>
+    <p:sldId id="337" r:id="rId28"/>
+    <p:sldId id="311" r:id="rId29"/>
+    <p:sldId id="312" r:id="rId30"/>
+    <p:sldId id="313" r:id="rId31"/>
+    <p:sldId id="314" r:id="rId32"/>
+    <p:sldId id="315" r:id="rId33"/>
+    <p:sldId id="316" r:id="rId34"/>
+    <p:sldId id="317" r:id="rId35"/>
+    <p:sldId id="318" r:id="rId36"/>
+    <p:sldId id="319" r:id="rId37"/>
+    <p:sldId id="320" r:id="rId38"/>
   </p:sldIdLst>
   <p:sldSz cx="12192000" cy="6858000"/>
   <p:notesSz cx="6858000" cy="9144000"/>
@@ -13468,10 +13485,10 @@
       </p:grpSpPr>
       <p:pic>
         <p:nvPicPr>
-          <p:cNvPr id="2" name="Picture 1">
+          <p:cNvPr id="5" name="Picture 4" descr="A screenshot of a computer&#10;&#10;AI-generated content may be incorrect.">
             <a:extLst>
               <a:ext uri="{FF2B5EF4-FFF2-40B4-BE49-F238E27FC236}">
-                <a16:creationId xmlns:a16="http://schemas.microsoft.com/office/drawing/2014/main" id="{7803A98C-BC3D-944F-91A7-38E0EE126A0F}"/>
+                <a16:creationId xmlns:a16="http://schemas.microsoft.com/office/drawing/2014/main" id="{4151A618-9E5E-4018-0EDD-F82894865EDA}"/>
               </a:ext>
             </a:extLst>
           </p:cNvPr>
@@ -13488,72 +13505,24 @@
               </a:ext>
             </a:extLst>
           </a:blip>
-          <a:srcRect/>
           <a:stretch>
             <a:fillRect/>
           </a:stretch>
         </p:blipFill>
-        <p:spPr bwMode="auto">
+        <p:spPr>
           <a:xfrm>
-            <a:off x="2110639" y="646047"/>
-            <a:ext cx="8323146" cy="6049721"/>
+            <a:off x="0" y="519820"/>
+            <a:ext cx="12192000" cy="5818360"/>
           </a:xfrm>
           <a:prstGeom prst="rect">
             <a:avLst/>
           </a:prstGeom>
-          <a:noFill/>
-          <a:ln>
-            <a:noFill/>
-          </a:ln>
         </p:spPr>
       </p:pic>
-      <p:sp>
-        <p:nvSpPr>
-          <p:cNvPr id="8" name="Título 1">
-            <a:extLst>
-              <a:ext uri="{FF2B5EF4-FFF2-40B4-BE49-F238E27FC236}">
-                <a16:creationId xmlns:a16="http://schemas.microsoft.com/office/drawing/2014/main" id="{FC9651F5-A991-D856-0684-3B01A1566DDB}"/>
-              </a:ext>
-            </a:extLst>
-          </p:cNvPr>
-          <p:cNvSpPr>
-            <a:spLocks noGrp="1"/>
-          </p:cNvSpPr>
-          <p:nvPr>
-            <p:ph type="title"/>
-          </p:nvPr>
-        </p:nvSpPr>
-        <p:spPr>
-          <a:xfrm>
-            <a:off x="166734" y="-203528"/>
-            <a:ext cx="3601556" cy="1325563"/>
-          </a:xfrm>
-        </p:spPr>
-        <p:txBody>
-          <a:bodyPr/>
-          <a:lstStyle/>
-          <a:p>
-            <a:pPr algn="ctr"/>
-            <a:r>
-              <a:rPr lang="es-MX" b="1" dirty="0">
-                <a:solidFill>
-                  <a:schemeClr val="accent5"/>
-                </a:solidFill>
-              </a:rPr>
-              <a:t>Administrador</a:t>
-            </a:r>
-            <a:endParaRPr lang="es-AR" b="1" dirty="0">
-              <a:solidFill>
-                <a:schemeClr val="accent5"/>
-              </a:solidFill>
-            </a:endParaRPr>
-          </a:p>
-        </p:txBody>
-      </p:sp>
     </p:spTree>
     <p:extLst>
       <p:ext uri="{BB962C8B-B14F-4D97-AF65-F5344CB8AC3E}">
-        <p14:creationId xmlns:p14="http://schemas.microsoft.com/office/powerpoint/2010/main" val="2720912390"/>
+        <p14:creationId xmlns:p14="http://schemas.microsoft.com/office/powerpoint/2010/main" val="4231397148"/>
       </p:ext>
     </p:extLst>
   </p:cSld>
@@ -13580,13 +13549,7 @@
   <p:cSld>
     <p:spTree>
       <p:nvGrpSpPr>
-        <p:cNvPr id="1" name="">
-          <a:extLst>
-            <a:ext uri="{FF2B5EF4-FFF2-40B4-BE49-F238E27FC236}">
-              <a16:creationId xmlns:a16="http://schemas.microsoft.com/office/drawing/2014/main" id="{8D093FA2-233D-9291-5131-C6DEC32854BE}"/>
-            </a:ext>
-          </a:extLst>
-        </p:cNvPr>
+        <p:cNvPr id="1" name=""/>
         <p:cNvGrpSpPr/>
         <p:nvPr/>
       </p:nvGrpSpPr>
@@ -13598,55 +13561,46 @@
           <a:chExt cx="0" cy="0"/>
         </a:xfrm>
       </p:grpSpPr>
-      <p:sp>
-        <p:nvSpPr>
-          <p:cNvPr id="2" name="Título 1">
+      <p:pic>
+        <p:nvPicPr>
+          <p:cNvPr id="5" name="Picture 4" descr="A screenshot of a phone&#10;&#10;AI-generated content may be incorrect.">
             <a:extLst>
               <a:ext uri="{FF2B5EF4-FFF2-40B4-BE49-F238E27FC236}">
-                <a16:creationId xmlns:a16="http://schemas.microsoft.com/office/drawing/2014/main" id="{08D965E4-8491-CB02-E5A4-12D68ACE8061}"/>
+                <a16:creationId xmlns:a16="http://schemas.microsoft.com/office/drawing/2014/main" id="{584F6D9A-1162-74A2-A537-08E5AEE0AC20}"/>
               </a:ext>
             </a:extLst>
           </p:cNvPr>
-          <p:cNvSpPr>
-            <a:spLocks noGrp="1"/>
-          </p:cNvSpPr>
-          <p:nvPr>
-            <p:ph type="title"/>
-          </p:nvPr>
-        </p:nvSpPr>
+          <p:cNvPicPr>
+            <a:picLocks noChangeAspect="1"/>
+          </p:cNvPicPr>
+          <p:nvPr/>
+        </p:nvPicPr>
+        <p:blipFill>
+          <a:blip r:embed="rId2">
+            <a:extLst>
+              <a:ext uri="{28A0092B-C50C-407E-A947-70E740481C1C}">
+                <a14:useLocalDpi xmlns:a14="http://schemas.microsoft.com/office/drawing/2010/main" val="0"/>
+              </a:ext>
+            </a:extLst>
+          </a:blip>
+          <a:stretch>
+            <a:fillRect/>
+          </a:stretch>
+        </p:blipFill>
         <p:spPr>
           <a:xfrm>
-            <a:off x="838200" y="2766218"/>
-            <a:ext cx="10515600" cy="1325563"/>
+            <a:off x="3473115" y="133770"/>
+            <a:ext cx="5245769" cy="6590459"/>
           </a:xfrm>
+          <a:prstGeom prst="rect">
+            <a:avLst/>
+          </a:prstGeom>
         </p:spPr>
-        <p:txBody>
-          <a:bodyPr>
-            <a:normAutofit/>
-          </a:bodyPr>
-          <a:lstStyle/>
-          <a:p>
-            <a:pPr algn="ctr"/>
-            <a:r>
-              <a:rPr lang="es-MX" sz="7200" b="1" dirty="0">
-                <a:solidFill>
-                  <a:schemeClr val="accent5"/>
-                </a:solidFill>
-              </a:rPr>
-              <a:t>Diagramas</a:t>
-            </a:r>
-            <a:endParaRPr lang="es-AR" sz="7200" b="1" dirty="0">
-              <a:solidFill>
-                <a:schemeClr val="accent5"/>
-              </a:solidFill>
-            </a:endParaRPr>
-          </a:p>
-        </p:txBody>
-      </p:sp>
+      </p:pic>
     </p:spTree>
     <p:extLst>
       <p:ext uri="{BB962C8B-B14F-4D97-AF65-F5344CB8AC3E}">
-        <p14:creationId xmlns:p14="http://schemas.microsoft.com/office/powerpoint/2010/main" val="3210059093"/>
+        <p14:creationId xmlns:p14="http://schemas.microsoft.com/office/powerpoint/2010/main" val="3820961138"/>
       </p:ext>
     </p:extLst>
   </p:cSld>
@@ -13687,10 +13641,10 @@
       </p:grpSpPr>
       <p:pic>
         <p:nvPicPr>
-          <p:cNvPr id="7" name="Picture 6" descr="A diagram of a computer&#10;&#10;AI-generated content may be incorrect.">
+          <p:cNvPr id="5" name="Picture 4" descr="A screenshot of a computer&#10;&#10;AI-generated content may be incorrect.">
             <a:extLst>
               <a:ext uri="{FF2B5EF4-FFF2-40B4-BE49-F238E27FC236}">
-                <a16:creationId xmlns:a16="http://schemas.microsoft.com/office/drawing/2014/main" id="{A4E91633-49B2-8152-4720-A9A8A602A0E6}"/>
+                <a16:creationId xmlns:a16="http://schemas.microsoft.com/office/drawing/2014/main" id="{00C6B86D-6802-A651-5474-83A1791A23EC}"/>
               </a:ext>
             </a:extLst>
           </p:cNvPr>
@@ -13713,58 +13667,18 @@
         </p:blipFill>
         <p:spPr>
           <a:xfrm>
-            <a:off x="1625774" y="0"/>
-            <a:ext cx="8940452" cy="6858000"/>
+            <a:off x="3139384" y="0"/>
+            <a:ext cx="5913232" cy="6858000"/>
           </a:xfrm>
           <a:prstGeom prst="rect">
             <a:avLst/>
           </a:prstGeom>
         </p:spPr>
       </p:pic>
-      <p:sp>
-        <p:nvSpPr>
-          <p:cNvPr id="8" name="TextBox 7">
-            <a:extLst>
-              <a:ext uri="{FF2B5EF4-FFF2-40B4-BE49-F238E27FC236}">
-                <a16:creationId xmlns:a16="http://schemas.microsoft.com/office/drawing/2014/main" id="{81B5224D-3675-7CD6-00F5-C2EBF044467F}"/>
-              </a:ext>
-            </a:extLst>
-          </p:cNvPr>
-          <p:cNvSpPr txBox="1"/>
-          <p:nvPr/>
-        </p:nvSpPr>
-        <p:spPr>
-          <a:xfrm>
-            <a:off x="401216" y="373224"/>
-            <a:ext cx="3697359" cy="523220"/>
-          </a:xfrm>
-          <a:prstGeom prst="rect">
-            <a:avLst/>
-          </a:prstGeom>
-          <a:noFill/>
-        </p:spPr>
-        <p:txBody>
-          <a:bodyPr wrap="none" rtlCol="0">
-            <a:spAutoFit/>
-          </a:bodyPr>
-          <a:lstStyle/>
-          <a:p>
-            <a:r>
-              <a:rPr lang="es-MX" sz="2800" b="1" dirty="0">
-                <a:solidFill>
-                  <a:schemeClr val="accent5"/>
-                </a:solidFill>
-              </a:rPr>
-              <a:t>Diagrama de Dominio</a:t>
-            </a:r>
-            <a:endParaRPr lang="es-AR" sz="2800" dirty="0"/>
-          </a:p>
-        </p:txBody>
-      </p:sp>
     </p:spTree>
     <p:extLst>
       <p:ext uri="{BB962C8B-B14F-4D97-AF65-F5344CB8AC3E}">
-        <p14:creationId xmlns:p14="http://schemas.microsoft.com/office/powerpoint/2010/main" val="2795754154"/>
+        <p14:creationId xmlns:p14="http://schemas.microsoft.com/office/powerpoint/2010/main" val="1319850339"/>
       </p:ext>
     </p:extLst>
   </p:cSld>
@@ -13805,10 +13719,10 @@
       </p:grpSpPr>
       <p:pic>
         <p:nvPicPr>
-          <p:cNvPr id="5" name="Picture 4" descr="A diagram of a computer&#10;&#10;AI-generated content may be incorrect.">
+          <p:cNvPr id="5" name="Picture 4" descr="A screenshot of a computer&#10;&#10;AI-generated content may be incorrect.">
             <a:extLst>
               <a:ext uri="{FF2B5EF4-FFF2-40B4-BE49-F238E27FC236}">
-                <a16:creationId xmlns:a16="http://schemas.microsoft.com/office/drawing/2014/main" id="{E11DE771-721A-5424-2C31-8CCB49580B41}"/>
+                <a16:creationId xmlns:a16="http://schemas.microsoft.com/office/drawing/2014/main" id="{0D1EDA3A-871C-8025-C56E-0ED8C482737A}"/>
               </a:ext>
             </a:extLst>
           </p:cNvPr>
@@ -13831,58 +13745,18 @@
         </p:blipFill>
         <p:spPr>
           <a:xfrm>
-            <a:off x="293117" y="664143"/>
-            <a:ext cx="11605765" cy="6193857"/>
+            <a:off x="0" y="626538"/>
+            <a:ext cx="12192000" cy="5604923"/>
           </a:xfrm>
           <a:prstGeom prst="rect">
             <a:avLst/>
           </a:prstGeom>
         </p:spPr>
       </p:pic>
-      <p:sp>
-        <p:nvSpPr>
-          <p:cNvPr id="6" name="TextBox 5">
-            <a:extLst>
-              <a:ext uri="{FF2B5EF4-FFF2-40B4-BE49-F238E27FC236}">
-                <a16:creationId xmlns:a16="http://schemas.microsoft.com/office/drawing/2014/main" id="{64BC767F-1703-8F98-5C88-4C2650C0ED27}"/>
-              </a:ext>
-            </a:extLst>
-          </p:cNvPr>
-          <p:cNvSpPr txBox="1"/>
-          <p:nvPr/>
-        </p:nvSpPr>
-        <p:spPr>
-          <a:xfrm>
-            <a:off x="410841" y="402533"/>
-            <a:ext cx="2262671" cy="523220"/>
-          </a:xfrm>
-          <a:prstGeom prst="rect">
-            <a:avLst/>
-          </a:prstGeom>
-          <a:noFill/>
-        </p:spPr>
-        <p:txBody>
-          <a:bodyPr wrap="none" rtlCol="0">
-            <a:spAutoFit/>
-          </a:bodyPr>
-          <a:lstStyle/>
-          <a:p>
-            <a:r>
-              <a:rPr lang="es-MX" sz="2800" b="1" dirty="0">
-                <a:solidFill>
-                  <a:schemeClr val="accent5"/>
-                </a:solidFill>
-              </a:rPr>
-              <a:t>Diagrama ER</a:t>
-            </a:r>
-            <a:endParaRPr lang="es-AR" sz="2800" dirty="0"/>
-          </a:p>
-        </p:txBody>
-      </p:sp>
     </p:spTree>
     <p:extLst>
       <p:ext uri="{BB962C8B-B14F-4D97-AF65-F5344CB8AC3E}">
-        <p14:creationId xmlns:p14="http://schemas.microsoft.com/office/powerpoint/2010/main" val="1831330011"/>
+        <p14:creationId xmlns:p14="http://schemas.microsoft.com/office/powerpoint/2010/main" val="1822031401"/>
       </p:ext>
     </p:extLst>
   </p:cSld>
@@ -13923,10 +13797,10 @@
       </p:grpSpPr>
       <p:pic>
         <p:nvPicPr>
-          <p:cNvPr id="5" name="Picture 4" descr="A diagram of a company&#10;&#10;AI-generated content may be incorrect.">
+          <p:cNvPr id="5" name="Picture 4" descr="A screenshot of a phone&#10;&#10;AI-generated content may be incorrect.">
             <a:extLst>
               <a:ext uri="{FF2B5EF4-FFF2-40B4-BE49-F238E27FC236}">
-                <a16:creationId xmlns:a16="http://schemas.microsoft.com/office/drawing/2014/main" id="{06A8B8ED-797D-A10A-52E1-6BBE7EEC3214}"/>
+                <a16:creationId xmlns:a16="http://schemas.microsoft.com/office/drawing/2014/main" id="{6F156A52-AAC1-6E6B-6DC9-9E05237D614C}"/>
               </a:ext>
             </a:extLst>
           </p:cNvPr>
@@ -13949,73 +13823,18 @@
         </p:blipFill>
         <p:spPr>
           <a:xfrm>
-            <a:off x="4183455" y="1"/>
-            <a:ext cx="3825089" cy="6857999"/>
+            <a:off x="3915878" y="136827"/>
+            <a:ext cx="4360243" cy="6584345"/>
           </a:xfrm>
           <a:prstGeom prst="rect">
             <a:avLst/>
           </a:prstGeom>
         </p:spPr>
       </p:pic>
-      <p:sp>
-        <p:nvSpPr>
-          <p:cNvPr id="6" name="TextBox 5">
-            <a:extLst>
-              <a:ext uri="{FF2B5EF4-FFF2-40B4-BE49-F238E27FC236}">
-                <a16:creationId xmlns:a16="http://schemas.microsoft.com/office/drawing/2014/main" id="{13D6592A-E3AA-A4F9-707D-6B6A1D1CE2FE}"/>
-              </a:ext>
-            </a:extLst>
-          </p:cNvPr>
-          <p:cNvSpPr txBox="1"/>
-          <p:nvPr/>
-        </p:nvSpPr>
-        <p:spPr>
-          <a:xfrm>
-            <a:off x="410841" y="402533"/>
-            <a:ext cx="3997530" cy="954107"/>
-          </a:xfrm>
-          <a:prstGeom prst="rect">
-            <a:avLst/>
-          </a:prstGeom>
-          <a:noFill/>
-        </p:spPr>
-        <p:txBody>
-          <a:bodyPr wrap="square" rtlCol="0">
-            <a:spAutoFit/>
-          </a:bodyPr>
-          <a:lstStyle/>
-          <a:p>
-            <a:r>
-              <a:rPr lang="es-MX" sz="2800" b="1" dirty="0">
-                <a:solidFill>
-                  <a:schemeClr val="accent5"/>
-                </a:solidFill>
-              </a:rPr>
-              <a:t>Diagrama de Estados:</a:t>
-            </a:r>
-            <a:br>
-              <a:rPr lang="es-MX" sz="2800" b="1" dirty="0">
-                <a:solidFill>
-                  <a:schemeClr val="accent5"/>
-                </a:solidFill>
-              </a:rPr>
-            </a:br>
-            <a:r>
-              <a:rPr lang="es-MX" sz="2800" b="1" dirty="0">
-                <a:solidFill>
-                  <a:schemeClr val="accent5"/>
-                </a:solidFill>
-              </a:rPr>
-              <a:t>Registrar Paciente</a:t>
-            </a:r>
-            <a:endParaRPr lang="es-AR" sz="2800" dirty="0"/>
-          </a:p>
-        </p:txBody>
-      </p:sp>
     </p:spTree>
     <p:extLst>
       <p:ext uri="{BB962C8B-B14F-4D97-AF65-F5344CB8AC3E}">
-        <p14:creationId xmlns:p14="http://schemas.microsoft.com/office/powerpoint/2010/main" val="550851345"/>
+        <p14:creationId xmlns:p14="http://schemas.microsoft.com/office/powerpoint/2010/main" val="1048911121"/>
       </p:ext>
     </p:extLst>
   </p:cSld>
@@ -14042,7 +13861,13 @@
   <p:cSld>
     <p:spTree>
       <p:nvGrpSpPr>
-        <p:cNvPr id="1" name=""/>
+        <p:cNvPr id="1" name="">
+          <a:extLst>
+            <a:ext uri="{FF2B5EF4-FFF2-40B4-BE49-F238E27FC236}">
+              <a16:creationId xmlns:a16="http://schemas.microsoft.com/office/drawing/2014/main" id="{5ACB90BD-BF2B-4632-A2FE-8FCC9DB80334}"/>
+            </a:ext>
+          </a:extLst>
+        </p:cNvPr>
         <p:cNvGrpSpPr/>
         <p:nvPr/>
       </p:nvGrpSpPr>
@@ -14054,48 +13879,49 @@
           <a:chExt cx="0" cy="0"/>
         </a:xfrm>
       </p:grpSpPr>
-      <p:pic>
-        <p:nvPicPr>
-          <p:cNvPr id="5" name="Picture 4" descr="A diagram of a patient&#10;&#10;AI-generated content may be incorrect.">
+      <p:sp>
+        <p:nvSpPr>
+          <p:cNvPr id="2" name="Title 1">
             <a:extLst>
               <a:ext uri="{FF2B5EF4-FFF2-40B4-BE49-F238E27FC236}">
-                <a16:creationId xmlns:a16="http://schemas.microsoft.com/office/drawing/2014/main" id="{09E3592D-C097-C285-74A2-75761117EE58}"/>
+                <a16:creationId xmlns:a16="http://schemas.microsoft.com/office/drawing/2014/main" id="{8123A203-7691-128F-3AB0-DF33B6232CB2}"/>
               </a:ext>
             </a:extLst>
           </p:cNvPr>
-          <p:cNvPicPr>
-            <a:picLocks noChangeAspect="1"/>
-          </p:cNvPicPr>
-          <p:nvPr/>
-        </p:nvPicPr>
-        <p:blipFill>
-          <a:blip r:embed="rId2">
-            <a:extLst>
-              <a:ext uri="{28A0092B-C50C-407E-A947-70E740481C1C}">
-                <a14:useLocalDpi xmlns:a14="http://schemas.microsoft.com/office/drawing/2010/main" val="0"/>
-              </a:ext>
-            </a:extLst>
-          </a:blip>
-          <a:stretch>
-            <a:fillRect/>
-          </a:stretch>
-        </p:blipFill>
+          <p:cNvSpPr>
+            <a:spLocks noGrp="1"/>
+          </p:cNvSpPr>
+          <p:nvPr>
+            <p:ph type="title"/>
+          </p:nvPr>
+        </p:nvSpPr>
         <p:spPr>
           <a:xfrm>
-            <a:off x="2577353" y="0"/>
-            <a:ext cx="7037294" cy="6858000"/>
+            <a:off x="481584" y="374269"/>
+            <a:ext cx="10515600" cy="1325563"/>
           </a:xfrm>
-          <a:prstGeom prst="rect">
-            <a:avLst/>
-          </a:prstGeom>
         </p:spPr>
-      </p:pic>
+        <p:txBody>
+          <a:bodyPr/>
+          <a:lstStyle/>
+          <a:p>
+            <a:r>
+              <a:rPr lang="es-AR" b="1" dirty="0">
+                <a:solidFill>
+                  <a:schemeClr val="accent5"/>
+                </a:solidFill>
+              </a:rPr>
+              <a:t>Médico</a:t>
+            </a:r>
+          </a:p>
+        </p:txBody>
+      </p:sp>
       <p:sp>
         <p:nvSpPr>
-          <p:cNvPr id="6" name="TextBox 5">
+          <p:cNvPr id="3" name="CuadroTexto 4">
             <a:extLst>
               <a:ext uri="{FF2B5EF4-FFF2-40B4-BE49-F238E27FC236}">
-                <a16:creationId xmlns:a16="http://schemas.microsoft.com/office/drawing/2014/main" id="{25A4692E-34ED-A3E4-5881-BC20F2298029}"/>
+                <a16:creationId xmlns:a16="http://schemas.microsoft.com/office/drawing/2014/main" id="{B99CBCD5-3BCB-0D50-2075-4C9FB8779080}"/>
               </a:ext>
             </a:extLst>
           </p:cNvPr>
@@ -14104,8 +13930,8 @@
         </p:nvSpPr>
         <p:spPr>
           <a:xfrm>
-            <a:off x="401216" y="344781"/>
-            <a:ext cx="3997530" cy="954107"/>
+            <a:off x="481584" y="1699832"/>
+            <a:ext cx="10655808" cy="2554545"/>
           </a:xfrm>
           <a:prstGeom prst="rect">
             <a:avLst/>
@@ -14118,37 +13944,72 @@
           </a:bodyPr>
           <a:lstStyle/>
           <a:p>
+            <a:pPr marL="457200" indent="-457200">
+              <a:lnSpc>
+                <a:spcPct val="100000"/>
+              </a:lnSpc>
+              <a:buFont typeface="Wingdings" panose="05000000000000000000" pitchFamily="2" charset="2"/>
+              <a:buChar char="q"/>
+            </a:pPr>
             <a:r>
-              <a:rPr lang="es-MX" sz="2800" b="1" dirty="0">
-                <a:solidFill>
-                  <a:schemeClr val="accent5"/>
-                </a:solidFill>
-              </a:rPr>
-              <a:t>Diagrama de Estados:</a:t>
+              <a:rPr lang="es-MX" sz="3200" dirty="0"/>
+              <a:t>CU12 – Acceder Agenda</a:t>
             </a:r>
-            <a:br>
-              <a:rPr lang="es-MX" sz="2800" b="1" dirty="0">
-                <a:solidFill>
-                  <a:schemeClr val="accent5"/>
-                </a:solidFill>
-              </a:rPr>
-            </a:br>
+          </a:p>
+          <a:p>
+            <a:pPr marL="457200" indent="-457200">
+              <a:lnSpc>
+                <a:spcPct val="100000"/>
+              </a:lnSpc>
+              <a:buFont typeface="Wingdings" panose="05000000000000000000" pitchFamily="2" charset="2"/>
+              <a:buChar char="q"/>
+            </a:pPr>
             <a:r>
-              <a:rPr lang="es-MX" sz="2800" b="1" dirty="0">
-                <a:solidFill>
-                  <a:schemeClr val="accent5"/>
-                </a:solidFill>
-              </a:rPr>
-              <a:t>Asignar Turno</a:t>
+              <a:rPr lang="es-MX" sz="3200" dirty="0"/>
+              <a:t>CU15 – Confirmar Asistencia del Paciente</a:t>
             </a:r>
-            <a:endParaRPr lang="es-AR" sz="2800" dirty="0"/>
+          </a:p>
+          <a:p>
+            <a:pPr marL="457200" indent="-457200">
+              <a:lnSpc>
+                <a:spcPct val="100000"/>
+              </a:lnSpc>
+              <a:buFont typeface="Wingdings" panose="05000000000000000000" pitchFamily="2" charset="2"/>
+              <a:buChar char="q"/>
+            </a:pPr>
+            <a:r>
+              <a:rPr lang="es-MX" sz="3200" dirty="0"/>
+              <a:t>CU16 – Acceder Historial Médico</a:t>
+            </a:r>
+          </a:p>
+          <a:p>
+            <a:pPr marL="457200" indent="-457200">
+              <a:lnSpc>
+                <a:spcPct val="100000"/>
+              </a:lnSpc>
+              <a:buFont typeface="Wingdings" panose="05000000000000000000" pitchFamily="2" charset="2"/>
+              <a:buChar char="q"/>
+            </a:pPr>
+            <a:r>
+              <a:rPr lang="es-MX" sz="3200" dirty="0"/>
+              <a:t>CU17 – Actualizar Historial Médico</a:t>
+            </a:r>
+          </a:p>
+          <a:p>
+            <a:pPr marL="0" indent="0">
+              <a:lnSpc>
+                <a:spcPct val="100000"/>
+              </a:lnSpc>
+              <a:buNone/>
+            </a:pPr>
+            <a:endParaRPr lang="es-MX" sz="3200" dirty="0"/>
           </a:p>
         </p:txBody>
       </p:sp>
     </p:spTree>
     <p:extLst>
       <p:ext uri="{BB962C8B-B14F-4D97-AF65-F5344CB8AC3E}">
-        <p14:creationId xmlns:p14="http://schemas.microsoft.com/office/powerpoint/2010/main" val="3774963023"/>
+        <p14:creationId xmlns:p14="http://schemas.microsoft.com/office/powerpoint/2010/main" val="4018201288"/>
       </p:ext>
     </p:extLst>
   </p:cSld>
@@ -14189,10 +14050,10 @@
       </p:grpSpPr>
       <p:pic>
         <p:nvPicPr>
-          <p:cNvPr id="5" name="Picture 4" descr="A diagram of a company&#10;&#10;AI-generated content may be incorrect.">
+          <p:cNvPr id="5" name="Picture 4" descr="A screenshot of a computer&#10;&#10;AI-generated content may be incorrect.">
             <a:extLst>
               <a:ext uri="{FF2B5EF4-FFF2-40B4-BE49-F238E27FC236}">
-                <a16:creationId xmlns:a16="http://schemas.microsoft.com/office/drawing/2014/main" id="{88C6AFD8-D145-6398-9C9C-5EC5C0F9B9F6}"/>
+                <a16:creationId xmlns:a16="http://schemas.microsoft.com/office/drawing/2014/main" id="{E71F9740-DB00-26AE-B995-943E7DE0F06C}"/>
               </a:ext>
             </a:extLst>
           </p:cNvPr>
@@ -14215,58 +14076,18 @@
         </p:blipFill>
         <p:spPr>
           <a:xfrm>
-            <a:off x="3722795" y="0"/>
-            <a:ext cx="4746409" cy="6858000"/>
+            <a:off x="0" y="1412452"/>
+            <a:ext cx="12192000" cy="4033095"/>
           </a:xfrm>
           <a:prstGeom prst="rect">
             <a:avLst/>
           </a:prstGeom>
         </p:spPr>
       </p:pic>
-      <p:sp>
-        <p:nvSpPr>
-          <p:cNvPr id="6" name="TextBox 5">
-            <a:extLst>
-              <a:ext uri="{FF2B5EF4-FFF2-40B4-BE49-F238E27FC236}">
-                <a16:creationId xmlns:a16="http://schemas.microsoft.com/office/drawing/2014/main" id="{487E0CFE-1929-21F2-279A-BB1E05A0D6F5}"/>
-              </a:ext>
-            </a:extLst>
-          </p:cNvPr>
-          <p:cNvSpPr txBox="1"/>
-          <p:nvPr/>
-        </p:nvSpPr>
-        <p:spPr>
-          <a:xfrm>
-            <a:off x="381965" y="392907"/>
-            <a:ext cx="4746409" cy="523220"/>
-          </a:xfrm>
-          <a:prstGeom prst="rect">
-            <a:avLst/>
-          </a:prstGeom>
-          <a:noFill/>
-        </p:spPr>
-        <p:txBody>
-          <a:bodyPr wrap="square" rtlCol="0">
-            <a:spAutoFit/>
-          </a:bodyPr>
-          <a:lstStyle/>
-          <a:p>
-            <a:r>
-              <a:rPr lang="es-MX" sz="2800" b="1" dirty="0">
-                <a:solidFill>
-                  <a:schemeClr val="accent5"/>
-                </a:solidFill>
-              </a:rPr>
-              <a:t>Diagrama de Estados: Turno</a:t>
-            </a:r>
-            <a:endParaRPr lang="es-AR" sz="2800" dirty="0"/>
-          </a:p>
-        </p:txBody>
-      </p:sp>
     </p:spTree>
     <p:extLst>
       <p:ext uri="{BB962C8B-B14F-4D97-AF65-F5344CB8AC3E}">
-        <p14:creationId xmlns:p14="http://schemas.microsoft.com/office/powerpoint/2010/main" val="2831033403"/>
+        <p14:creationId xmlns:p14="http://schemas.microsoft.com/office/powerpoint/2010/main" val="2348177058"/>
       </p:ext>
     </p:extLst>
   </p:cSld>
@@ -14307,10 +14128,10 @@
       </p:grpSpPr>
       <p:pic>
         <p:nvPicPr>
-          <p:cNvPr id="5" name="Picture 4" descr="A diagram of a company&#10;&#10;AI-generated content may be incorrect.">
+          <p:cNvPr id="5" name="Picture 4" descr="A screenshot of a computer&#10;&#10;AI-generated content may be incorrect.">
             <a:extLst>
               <a:ext uri="{FF2B5EF4-FFF2-40B4-BE49-F238E27FC236}">
-                <a16:creationId xmlns:a16="http://schemas.microsoft.com/office/drawing/2014/main" id="{21433FAE-BEAC-55F7-38E7-5A70C81DC169}"/>
+                <a16:creationId xmlns:a16="http://schemas.microsoft.com/office/drawing/2014/main" id="{0C4EB6AD-3894-A299-DA22-23C2CA3F8349}"/>
               </a:ext>
             </a:extLst>
           </p:cNvPr>
@@ -14333,58 +14154,18 @@
         </p:blipFill>
         <p:spPr>
           <a:xfrm>
-            <a:off x="0" y="1139536"/>
-            <a:ext cx="12192000" cy="5579954"/>
+            <a:off x="0" y="1478636"/>
+            <a:ext cx="12192000" cy="3900727"/>
           </a:xfrm>
           <a:prstGeom prst="rect">
             <a:avLst/>
           </a:prstGeom>
         </p:spPr>
       </p:pic>
-      <p:sp>
-        <p:nvSpPr>
-          <p:cNvPr id="6" name="TextBox 5">
-            <a:extLst>
-              <a:ext uri="{FF2B5EF4-FFF2-40B4-BE49-F238E27FC236}">
-                <a16:creationId xmlns:a16="http://schemas.microsoft.com/office/drawing/2014/main" id="{A2169ABD-95C2-59A1-E457-C95EE3D28F4E}"/>
-              </a:ext>
-            </a:extLst>
-          </p:cNvPr>
-          <p:cNvSpPr txBox="1"/>
-          <p:nvPr/>
-        </p:nvSpPr>
-        <p:spPr>
-          <a:xfrm>
-            <a:off x="333838" y="383282"/>
-            <a:ext cx="4746409" cy="523220"/>
-          </a:xfrm>
-          <a:prstGeom prst="rect">
-            <a:avLst/>
-          </a:prstGeom>
-          <a:noFill/>
-        </p:spPr>
-        <p:txBody>
-          <a:bodyPr wrap="square" rtlCol="0">
-            <a:spAutoFit/>
-          </a:bodyPr>
-          <a:lstStyle/>
-          <a:p>
-            <a:r>
-              <a:rPr lang="es-MX" sz="2800" b="1" dirty="0">
-                <a:solidFill>
-                  <a:schemeClr val="accent5"/>
-                </a:solidFill>
-              </a:rPr>
-              <a:t>Diagrama de Componentes</a:t>
-            </a:r>
-            <a:endParaRPr lang="es-AR" sz="2800" dirty="0"/>
-          </a:p>
-        </p:txBody>
-      </p:sp>
     </p:spTree>
     <p:extLst>
       <p:ext uri="{BB962C8B-B14F-4D97-AF65-F5344CB8AC3E}">
-        <p14:creationId xmlns:p14="http://schemas.microsoft.com/office/powerpoint/2010/main" val="3095768530"/>
+        <p14:creationId xmlns:p14="http://schemas.microsoft.com/office/powerpoint/2010/main" val="3900746502"/>
       </p:ext>
     </p:extLst>
   </p:cSld>
@@ -14425,10 +14206,10 @@
       </p:grpSpPr>
       <p:pic>
         <p:nvPicPr>
-          <p:cNvPr id="5" name="Picture 4" descr="A close-up of a logo&#10;&#10;AI-generated content may be incorrect.">
+          <p:cNvPr id="5" name="Picture 4" descr="A screenshot of a computer&#10;&#10;AI-generated content may be incorrect.">
             <a:extLst>
               <a:ext uri="{FF2B5EF4-FFF2-40B4-BE49-F238E27FC236}">
-                <a16:creationId xmlns:a16="http://schemas.microsoft.com/office/drawing/2014/main" id="{C9EEEE8D-6656-D75A-AF05-08131A6F2E6C}"/>
+                <a16:creationId xmlns:a16="http://schemas.microsoft.com/office/drawing/2014/main" id="{6C317D3D-A1D4-D926-12EB-259DD493215D}"/>
               </a:ext>
             </a:extLst>
           </p:cNvPr>
@@ -14451,58 +14232,18 @@
         </p:blipFill>
         <p:spPr>
           <a:xfrm>
-            <a:off x="202120" y="1546233"/>
-            <a:ext cx="11787759" cy="3765534"/>
+            <a:off x="0" y="707105"/>
+            <a:ext cx="12192000" cy="5443789"/>
           </a:xfrm>
           <a:prstGeom prst="rect">
             <a:avLst/>
           </a:prstGeom>
         </p:spPr>
       </p:pic>
-      <p:sp>
-        <p:nvSpPr>
-          <p:cNvPr id="6" name="TextBox 5">
-            <a:extLst>
-              <a:ext uri="{FF2B5EF4-FFF2-40B4-BE49-F238E27FC236}">
-                <a16:creationId xmlns:a16="http://schemas.microsoft.com/office/drawing/2014/main" id="{88647607-2AF0-AF1A-E6B8-8151DC8E5D31}"/>
-              </a:ext>
-            </a:extLst>
-          </p:cNvPr>
-          <p:cNvSpPr txBox="1"/>
-          <p:nvPr/>
-        </p:nvSpPr>
-        <p:spPr>
-          <a:xfrm>
-            <a:off x="343464" y="489160"/>
-            <a:ext cx="4746409" cy="523220"/>
-          </a:xfrm>
-          <a:prstGeom prst="rect">
-            <a:avLst/>
-          </a:prstGeom>
-          <a:noFill/>
-        </p:spPr>
-        <p:txBody>
-          <a:bodyPr wrap="square" rtlCol="0">
-            <a:spAutoFit/>
-          </a:bodyPr>
-          <a:lstStyle/>
-          <a:p>
-            <a:r>
-              <a:rPr lang="es-MX" sz="2800" b="1" dirty="0">
-                <a:solidFill>
-                  <a:schemeClr val="accent5"/>
-                </a:solidFill>
-              </a:rPr>
-              <a:t>Diagrama de Arquitectura</a:t>
-            </a:r>
-            <a:endParaRPr lang="es-AR" sz="2800" dirty="0"/>
-          </a:p>
-        </p:txBody>
-      </p:sp>
     </p:spTree>
     <p:extLst>
       <p:ext uri="{BB962C8B-B14F-4D97-AF65-F5344CB8AC3E}">
-        <p14:creationId xmlns:p14="http://schemas.microsoft.com/office/powerpoint/2010/main" val="2247602145"/>
+        <p14:creationId xmlns:p14="http://schemas.microsoft.com/office/powerpoint/2010/main" val="3304941215"/>
       </p:ext>
     </p:extLst>
   </p:cSld>
@@ -14541,52 +14282,12 @@
           <a:chExt cx="0" cy="0"/>
         </a:xfrm>
       </p:grpSpPr>
-      <p:sp>
-        <p:nvSpPr>
-          <p:cNvPr id="4" name="TextBox 3">
+      <p:pic>
+        <p:nvPicPr>
+          <p:cNvPr id="5" name="Picture 4" descr="A screenshot of a computer&#10;&#10;AI-generated content may be incorrect.">
             <a:extLst>
               <a:ext uri="{FF2B5EF4-FFF2-40B4-BE49-F238E27FC236}">
-                <a16:creationId xmlns:a16="http://schemas.microsoft.com/office/drawing/2014/main" id="{B0F00AD9-DA18-F3E6-842A-68F496FB5AE8}"/>
-              </a:ext>
-            </a:extLst>
-          </p:cNvPr>
-          <p:cNvSpPr txBox="1"/>
-          <p:nvPr/>
-        </p:nvSpPr>
-        <p:spPr>
-          <a:xfrm>
-            <a:off x="353089" y="575788"/>
-            <a:ext cx="4746409" cy="523220"/>
-          </a:xfrm>
-          <a:prstGeom prst="rect">
-            <a:avLst/>
-          </a:prstGeom>
-          <a:noFill/>
-        </p:spPr>
-        <p:txBody>
-          <a:bodyPr wrap="square" rtlCol="0">
-            <a:spAutoFit/>
-          </a:bodyPr>
-          <a:lstStyle/>
-          <a:p>
-            <a:r>
-              <a:rPr lang="es-MX" sz="2800" b="1" dirty="0">
-                <a:solidFill>
-                  <a:schemeClr val="accent5"/>
-                </a:solidFill>
-              </a:rPr>
-              <a:t>Diagrama de Despliegue</a:t>
-            </a:r>
-            <a:endParaRPr lang="es-AR" sz="2800" dirty="0"/>
-          </a:p>
-        </p:txBody>
-      </p:sp>
-      <p:pic>
-        <p:nvPicPr>
-          <p:cNvPr id="6" name="Picture 5" descr="A pink sign with a gear and text&#10;&#10;AI-generated content may be incorrect.">
-            <a:extLst>
-              <a:ext uri="{FF2B5EF4-FFF2-40B4-BE49-F238E27FC236}">
-                <a16:creationId xmlns:a16="http://schemas.microsoft.com/office/drawing/2014/main" id="{171A30CD-77BE-F205-D8CF-83568DA3945E}"/>
+                <a16:creationId xmlns:a16="http://schemas.microsoft.com/office/drawing/2014/main" id="{60944032-3AA6-6C3B-DFA3-1E5DB573FD26}"/>
               </a:ext>
             </a:extLst>
           </p:cNvPr>
@@ -14609,8 +14310,8 @@
         </p:blipFill>
         <p:spPr>
           <a:xfrm>
-            <a:off x="2245823" y="2494647"/>
-            <a:ext cx="7700353" cy="1868705"/>
+            <a:off x="1979717" y="1217558"/>
+            <a:ext cx="8232565" cy="4422884"/>
           </a:xfrm>
           <a:prstGeom prst="rect">
             <a:avLst/>
@@ -14620,7 +14321,7 @@
     </p:spTree>
     <p:extLst>
       <p:ext uri="{BB962C8B-B14F-4D97-AF65-F5344CB8AC3E}">
-        <p14:creationId xmlns:p14="http://schemas.microsoft.com/office/powerpoint/2010/main" val="1655993064"/>
+        <p14:creationId xmlns:p14="http://schemas.microsoft.com/office/powerpoint/2010/main" val="1923560749"/>
       </p:ext>
     </p:extLst>
   </p:cSld>
@@ -15087,548 +14788,6 @@
   <p:cSld>
     <p:spTree>
       <p:nvGrpSpPr>
-        <p:cNvPr id="1" name=""/>
-        <p:cNvGrpSpPr/>
-        <p:nvPr/>
-      </p:nvGrpSpPr>
-      <p:grpSpPr>
-        <a:xfrm>
-          <a:off x="0" y="0"/>
-          <a:ext cx="0" cy="0"/>
-          <a:chOff x="0" y="0"/>
-          <a:chExt cx="0" cy="0"/>
-        </a:xfrm>
-      </p:grpSpPr>
-      <p:sp>
-        <p:nvSpPr>
-          <p:cNvPr id="4" name="Título 1">
-            <a:extLst>
-              <a:ext uri="{FF2B5EF4-FFF2-40B4-BE49-F238E27FC236}">
-                <a16:creationId xmlns:a16="http://schemas.microsoft.com/office/drawing/2014/main" id="{E8BB9829-14AE-CA6A-CB9F-AFE4EB75D2A2}"/>
-              </a:ext>
-            </a:extLst>
-          </p:cNvPr>
-          <p:cNvSpPr>
-            <a:spLocks noGrp="1"/>
-          </p:cNvSpPr>
-          <p:nvPr>
-            <p:ph type="title"/>
-          </p:nvPr>
-        </p:nvSpPr>
-        <p:spPr>
-          <a:xfrm>
-            <a:off x="838200" y="2766218"/>
-            <a:ext cx="10515600" cy="1325563"/>
-          </a:xfrm>
-        </p:spPr>
-        <p:txBody>
-          <a:bodyPr>
-            <a:normAutofit/>
-          </a:bodyPr>
-          <a:lstStyle/>
-          <a:p>
-            <a:pPr algn="ctr"/>
-            <a:r>
-              <a:rPr lang="es-MX" sz="7200" b="1" dirty="0">
-                <a:solidFill>
-                  <a:schemeClr val="accent5"/>
-                </a:solidFill>
-              </a:rPr>
-              <a:t>¡MUCHAS GRACIAS!</a:t>
-            </a:r>
-            <a:endParaRPr lang="es-AR" sz="7200" b="1" dirty="0">
-              <a:solidFill>
-                <a:schemeClr val="accent5"/>
-              </a:solidFill>
-            </a:endParaRPr>
-          </a:p>
-        </p:txBody>
-      </p:sp>
-    </p:spTree>
-    <p:extLst>
-      <p:ext uri="{BB962C8B-B14F-4D97-AF65-F5344CB8AC3E}">
-        <p14:creationId xmlns:p14="http://schemas.microsoft.com/office/powerpoint/2010/main" val="2160946102"/>
-      </p:ext>
-    </p:extLst>
-  </p:cSld>
-  <p:clrMapOvr>
-    <a:masterClrMapping/>
-  </p:clrMapOvr>
-  <mc:AlternateContent xmlns:mc="http://schemas.openxmlformats.org/markup-compatibility/2006" xmlns:p159="http://schemas.microsoft.com/office/powerpoint/2015/09/main">
-    <mc:Choice Requires="p159">
-      <p:transition spd="med">
-        <p159:morph option="byObject"/>
-      </p:transition>
-    </mc:Choice>
-    <mc:Fallback xmlns="">
-      <p:transition spd="med">
-        <p:fade/>
-      </p:transition>
-    </mc:Fallback>
-  </mc:AlternateContent>
-</p:sld>
-</file>
-
-<file path=ppt/slides/slide3.xml><?xml version="1.0" encoding="utf-8"?>
-<p:sld xmlns:a="http://schemas.openxmlformats.org/drawingml/2006/main" xmlns:r="http://schemas.openxmlformats.org/officeDocument/2006/relationships" xmlns:p="http://schemas.openxmlformats.org/presentationml/2006/main">
-  <p:cSld>
-    <p:spTree>
-      <p:nvGrpSpPr>
-        <p:cNvPr id="1" name=""/>
-        <p:cNvGrpSpPr/>
-        <p:nvPr/>
-      </p:nvGrpSpPr>
-      <p:grpSpPr>
-        <a:xfrm>
-          <a:off x="0" y="0"/>
-          <a:ext cx="0" cy="0"/>
-          <a:chOff x="0" y="0"/>
-          <a:chExt cx="0" cy="0"/>
-        </a:xfrm>
-      </p:grpSpPr>
-      <p:sp>
-        <p:nvSpPr>
-          <p:cNvPr id="2" name="Título 1">
-            <a:extLst>
-              <a:ext uri="{FF2B5EF4-FFF2-40B4-BE49-F238E27FC236}">
-                <a16:creationId xmlns:a16="http://schemas.microsoft.com/office/drawing/2014/main" id="{7591DDE4-C63E-CD77-1DB2-E7F0F7ED0E75}"/>
-              </a:ext>
-            </a:extLst>
-          </p:cNvPr>
-          <p:cNvSpPr>
-            <a:spLocks noGrp="1"/>
-          </p:cNvSpPr>
-          <p:nvPr>
-            <p:ph type="title"/>
-          </p:nvPr>
-        </p:nvSpPr>
-        <p:spPr>
-          <a:xfrm>
-            <a:off x="838200" y="1524841"/>
-            <a:ext cx="10515600" cy="3808317"/>
-          </a:xfrm>
-        </p:spPr>
-        <p:txBody>
-          <a:bodyPr>
-            <a:normAutofit/>
-          </a:bodyPr>
-          <a:lstStyle/>
-          <a:p>
-            <a:pPr algn="ctr"/>
-            <a:r>
-              <a:rPr lang="es-MX" sz="7200" b="1" dirty="0">
-                <a:solidFill>
-                  <a:schemeClr val="accent5"/>
-                </a:solidFill>
-              </a:rPr>
-              <a:t>Roles </a:t>
-            </a:r>
-            <a:br>
-              <a:rPr lang="es-MX" sz="7200" b="1" dirty="0">
-                <a:solidFill>
-                  <a:schemeClr val="accent5"/>
-                </a:solidFill>
-              </a:rPr>
-            </a:br>
-            <a:r>
-              <a:rPr lang="es-MX" sz="7200" b="1" dirty="0">
-                <a:solidFill>
-                  <a:schemeClr val="accent5"/>
-                </a:solidFill>
-              </a:rPr>
-              <a:t>y </a:t>
-            </a:r>
-            <a:br>
-              <a:rPr lang="es-MX" sz="7200" b="1" dirty="0">
-                <a:solidFill>
-                  <a:schemeClr val="accent5"/>
-                </a:solidFill>
-              </a:rPr>
-            </a:br>
-            <a:r>
-              <a:rPr lang="es-MX" sz="7200" b="1" dirty="0">
-                <a:solidFill>
-                  <a:schemeClr val="accent5"/>
-                </a:solidFill>
-              </a:rPr>
-              <a:t>Casos de Uso Principales</a:t>
-            </a:r>
-            <a:endParaRPr lang="es-AR" sz="7200" b="1" dirty="0">
-              <a:solidFill>
-                <a:schemeClr val="accent5"/>
-              </a:solidFill>
-            </a:endParaRPr>
-          </a:p>
-        </p:txBody>
-      </p:sp>
-    </p:spTree>
-    <p:extLst>
-      <p:ext uri="{BB962C8B-B14F-4D97-AF65-F5344CB8AC3E}">
-        <p14:creationId xmlns:p14="http://schemas.microsoft.com/office/powerpoint/2010/main" val="2559050008"/>
-      </p:ext>
-    </p:extLst>
-  </p:cSld>
-  <p:clrMapOvr>
-    <a:masterClrMapping/>
-  </p:clrMapOvr>
-  <mc:AlternateContent xmlns:mc="http://schemas.openxmlformats.org/markup-compatibility/2006" xmlns:p159="http://schemas.microsoft.com/office/powerpoint/2015/09/main">
-    <mc:Choice Requires="p159">
-      <p:transition spd="med">
-        <p159:morph option="byObject"/>
-      </p:transition>
-    </mc:Choice>
-    <mc:Fallback xmlns="">
-      <p:transition spd="med">
-        <p:fade/>
-      </p:transition>
-    </mc:Fallback>
-  </mc:AlternateContent>
-</p:sld>
-</file>
-
-<file path=ppt/slides/slide4.xml><?xml version="1.0" encoding="utf-8"?>
-<p:sld xmlns:a="http://schemas.openxmlformats.org/drawingml/2006/main" xmlns:r="http://schemas.openxmlformats.org/officeDocument/2006/relationships" xmlns:p="http://schemas.openxmlformats.org/presentationml/2006/main">
-  <p:cSld>
-    <p:spTree>
-      <p:nvGrpSpPr>
-        <p:cNvPr id="1" name=""/>
-        <p:cNvGrpSpPr/>
-        <p:nvPr/>
-      </p:nvGrpSpPr>
-      <p:grpSpPr>
-        <a:xfrm>
-          <a:off x="0" y="0"/>
-          <a:ext cx="0" cy="0"/>
-          <a:chOff x="0" y="0"/>
-          <a:chExt cx="0" cy="0"/>
-        </a:xfrm>
-      </p:grpSpPr>
-      <p:sp>
-        <p:nvSpPr>
-          <p:cNvPr id="2" name="Title 1">
-            <a:extLst>
-              <a:ext uri="{FF2B5EF4-FFF2-40B4-BE49-F238E27FC236}">
-                <a16:creationId xmlns:a16="http://schemas.microsoft.com/office/drawing/2014/main" id="{FE60DA79-526D-4B44-4472-17175C8E285C}"/>
-              </a:ext>
-            </a:extLst>
-          </p:cNvPr>
-          <p:cNvSpPr>
-            <a:spLocks noGrp="1"/>
-          </p:cNvSpPr>
-          <p:nvPr>
-            <p:ph type="title"/>
-          </p:nvPr>
-        </p:nvSpPr>
-        <p:spPr>
-          <a:xfrm>
-            <a:off x="481584" y="374269"/>
-            <a:ext cx="10515600" cy="1325563"/>
-          </a:xfrm>
-        </p:spPr>
-        <p:txBody>
-          <a:bodyPr/>
-          <a:lstStyle/>
-          <a:p>
-            <a:r>
-              <a:rPr lang="es-AR" b="1" dirty="0">
-                <a:solidFill>
-                  <a:schemeClr val="accent5"/>
-                </a:solidFill>
-              </a:rPr>
-              <a:t>Secretario</a:t>
-            </a:r>
-          </a:p>
-        </p:txBody>
-      </p:sp>
-      <p:sp>
-        <p:nvSpPr>
-          <p:cNvPr id="6" name="CuadroTexto 8">
-            <a:extLst>
-              <a:ext uri="{FF2B5EF4-FFF2-40B4-BE49-F238E27FC236}">
-                <a16:creationId xmlns:a16="http://schemas.microsoft.com/office/drawing/2014/main" id="{FFD943E9-C8D8-A3DA-58B0-1857813CF323}"/>
-              </a:ext>
-            </a:extLst>
-          </p:cNvPr>
-          <p:cNvSpPr txBox="1"/>
-          <p:nvPr/>
-        </p:nvSpPr>
-        <p:spPr>
-          <a:xfrm>
-            <a:off x="481584" y="1480376"/>
-            <a:ext cx="11397226" cy="2554545"/>
-          </a:xfrm>
-          <a:prstGeom prst="rect">
-            <a:avLst/>
-          </a:prstGeom>
-          <a:noFill/>
-        </p:spPr>
-        <p:txBody>
-          <a:bodyPr wrap="square" rtlCol="0">
-            <a:spAutoFit/>
-          </a:bodyPr>
-          <a:lstStyle/>
-          <a:p>
-            <a:pPr marL="457200" indent="-457200">
-              <a:lnSpc>
-                <a:spcPct val="100000"/>
-              </a:lnSpc>
-              <a:buFont typeface="Wingdings" panose="05000000000000000000" pitchFamily="2" charset="2"/>
-              <a:buChar char="q"/>
-            </a:pPr>
-            <a:r>
-              <a:rPr lang="es-MX" sz="3200" dirty="0"/>
-              <a:t>CU01 – Ver Agenda Médica</a:t>
-            </a:r>
-          </a:p>
-          <a:p>
-            <a:pPr marL="457200" indent="-457200">
-              <a:lnSpc>
-                <a:spcPct val="100000"/>
-              </a:lnSpc>
-              <a:buFont typeface="Wingdings" panose="05000000000000000000" pitchFamily="2" charset="2"/>
-              <a:buChar char="q"/>
-            </a:pPr>
-            <a:r>
-              <a:rPr lang="es-MX" sz="3200" dirty="0"/>
-              <a:t>CU02 – Registrar Pago.</a:t>
-            </a:r>
-          </a:p>
-          <a:p>
-            <a:pPr marL="457200" indent="-457200">
-              <a:lnSpc>
-                <a:spcPct val="100000"/>
-              </a:lnSpc>
-              <a:buFont typeface="Wingdings" panose="05000000000000000000" pitchFamily="2" charset="2"/>
-              <a:buChar char="q"/>
-            </a:pPr>
-            <a:r>
-              <a:rPr lang="es-MX" sz="3200" dirty="0"/>
-              <a:t>CU04 – Registrar Paciente.</a:t>
-            </a:r>
-          </a:p>
-          <a:p>
-            <a:pPr marL="457200" indent="-457200">
-              <a:lnSpc>
-                <a:spcPct val="100000"/>
-              </a:lnSpc>
-              <a:buFont typeface="Wingdings" panose="05000000000000000000" pitchFamily="2" charset="2"/>
-              <a:buChar char="q"/>
-            </a:pPr>
-            <a:r>
-              <a:rPr lang="es-MX" sz="3200" dirty="0"/>
-              <a:t>CU09 – Crear Turno.</a:t>
-            </a:r>
-          </a:p>
-          <a:p>
-            <a:endParaRPr lang="es-AR" sz="3200" dirty="0"/>
-          </a:p>
-        </p:txBody>
-      </p:sp>
-    </p:spTree>
-    <p:extLst>
-      <p:ext uri="{BB962C8B-B14F-4D97-AF65-F5344CB8AC3E}">
-        <p14:creationId xmlns:p14="http://schemas.microsoft.com/office/powerpoint/2010/main" val="4211660537"/>
-      </p:ext>
-    </p:extLst>
-  </p:cSld>
-  <p:clrMapOvr>
-    <a:masterClrMapping/>
-  </p:clrMapOvr>
-  <mc:AlternateContent xmlns:mc="http://schemas.openxmlformats.org/markup-compatibility/2006" xmlns:p159="http://schemas.microsoft.com/office/powerpoint/2015/09/main">
-    <mc:Choice Requires="p159">
-      <p:transition spd="med">
-        <p159:morph option="byObject"/>
-      </p:transition>
-    </mc:Choice>
-    <mc:Fallback xmlns="">
-      <p:transition spd="med">
-        <p:fade/>
-      </p:transition>
-    </mc:Fallback>
-  </mc:AlternateContent>
-</p:sld>
-</file>
-
-<file path=ppt/slides/slide5.xml><?xml version="1.0" encoding="utf-8"?>
-<p:sld xmlns:a="http://schemas.openxmlformats.org/drawingml/2006/main" xmlns:r="http://schemas.openxmlformats.org/officeDocument/2006/relationships" xmlns:p="http://schemas.openxmlformats.org/presentationml/2006/main">
-  <p:cSld>
-    <p:spTree>
-      <p:nvGrpSpPr>
-        <p:cNvPr id="1" name="">
-          <a:extLst>
-            <a:ext uri="{FF2B5EF4-FFF2-40B4-BE49-F238E27FC236}">
-              <a16:creationId xmlns:a16="http://schemas.microsoft.com/office/drawing/2014/main" id="{5ACB90BD-BF2B-4632-A2FE-8FCC9DB80334}"/>
-            </a:ext>
-          </a:extLst>
-        </p:cNvPr>
-        <p:cNvGrpSpPr/>
-        <p:nvPr/>
-      </p:nvGrpSpPr>
-      <p:grpSpPr>
-        <a:xfrm>
-          <a:off x="0" y="0"/>
-          <a:ext cx="0" cy="0"/>
-          <a:chOff x="0" y="0"/>
-          <a:chExt cx="0" cy="0"/>
-        </a:xfrm>
-      </p:grpSpPr>
-      <p:sp>
-        <p:nvSpPr>
-          <p:cNvPr id="2" name="Title 1">
-            <a:extLst>
-              <a:ext uri="{FF2B5EF4-FFF2-40B4-BE49-F238E27FC236}">
-                <a16:creationId xmlns:a16="http://schemas.microsoft.com/office/drawing/2014/main" id="{8123A203-7691-128F-3AB0-DF33B6232CB2}"/>
-              </a:ext>
-            </a:extLst>
-          </p:cNvPr>
-          <p:cNvSpPr>
-            <a:spLocks noGrp="1"/>
-          </p:cNvSpPr>
-          <p:nvPr>
-            <p:ph type="title"/>
-          </p:nvPr>
-        </p:nvSpPr>
-        <p:spPr>
-          <a:xfrm>
-            <a:off x="481584" y="374269"/>
-            <a:ext cx="10515600" cy="1325563"/>
-          </a:xfrm>
-        </p:spPr>
-        <p:txBody>
-          <a:bodyPr/>
-          <a:lstStyle/>
-          <a:p>
-            <a:r>
-              <a:rPr lang="es-AR" b="1" dirty="0">
-                <a:solidFill>
-                  <a:schemeClr val="accent5"/>
-                </a:solidFill>
-              </a:rPr>
-              <a:t>Médico</a:t>
-            </a:r>
-          </a:p>
-        </p:txBody>
-      </p:sp>
-      <p:sp>
-        <p:nvSpPr>
-          <p:cNvPr id="3" name="CuadroTexto 4">
-            <a:extLst>
-              <a:ext uri="{FF2B5EF4-FFF2-40B4-BE49-F238E27FC236}">
-                <a16:creationId xmlns:a16="http://schemas.microsoft.com/office/drawing/2014/main" id="{B99CBCD5-3BCB-0D50-2075-4C9FB8779080}"/>
-              </a:ext>
-            </a:extLst>
-          </p:cNvPr>
-          <p:cNvSpPr txBox="1"/>
-          <p:nvPr/>
-        </p:nvSpPr>
-        <p:spPr>
-          <a:xfrm>
-            <a:off x="481584" y="1699832"/>
-            <a:ext cx="10655808" cy="2554545"/>
-          </a:xfrm>
-          <a:prstGeom prst="rect">
-            <a:avLst/>
-          </a:prstGeom>
-          <a:noFill/>
-        </p:spPr>
-        <p:txBody>
-          <a:bodyPr wrap="square" rtlCol="0">
-            <a:spAutoFit/>
-          </a:bodyPr>
-          <a:lstStyle/>
-          <a:p>
-            <a:pPr marL="457200" indent="-457200">
-              <a:lnSpc>
-                <a:spcPct val="100000"/>
-              </a:lnSpc>
-              <a:buFont typeface="Wingdings" panose="05000000000000000000" pitchFamily="2" charset="2"/>
-              <a:buChar char="q"/>
-            </a:pPr>
-            <a:r>
-              <a:rPr lang="es-MX" sz="3200" dirty="0"/>
-              <a:t>CU12 – Acceder Agenda.</a:t>
-            </a:r>
-          </a:p>
-          <a:p>
-            <a:pPr marL="457200" indent="-457200">
-              <a:lnSpc>
-                <a:spcPct val="100000"/>
-              </a:lnSpc>
-              <a:buFont typeface="Wingdings" panose="05000000000000000000" pitchFamily="2" charset="2"/>
-              <a:buChar char="q"/>
-            </a:pPr>
-            <a:r>
-              <a:rPr lang="es-MX" sz="3200" dirty="0"/>
-              <a:t>CU15 – Confirmar Asistencia del Paciente.</a:t>
-            </a:r>
-          </a:p>
-          <a:p>
-            <a:pPr marL="457200" indent="-457200">
-              <a:lnSpc>
-                <a:spcPct val="100000"/>
-              </a:lnSpc>
-              <a:buFont typeface="Wingdings" panose="05000000000000000000" pitchFamily="2" charset="2"/>
-              <a:buChar char="q"/>
-            </a:pPr>
-            <a:r>
-              <a:rPr lang="es-MX" sz="3200" dirty="0"/>
-              <a:t>CU16 – Acceder Historial Médico.</a:t>
-            </a:r>
-          </a:p>
-          <a:p>
-            <a:pPr marL="457200" indent="-457200">
-              <a:lnSpc>
-                <a:spcPct val="100000"/>
-              </a:lnSpc>
-              <a:buFont typeface="Wingdings" panose="05000000000000000000" pitchFamily="2" charset="2"/>
-              <a:buChar char="q"/>
-            </a:pPr>
-            <a:r>
-              <a:rPr lang="es-MX" sz="3200" dirty="0"/>
-              <a:t>CU17 – Actualizar Historial Médico.</a:t>
-            </a:r>
-          </a:p>
-          <a:p>
-            <a:pPr marL="0" indent="0">
-              <a:lnSpc>
-                <a:spcPct val="100000"/>
-              </a:lnSpc>
-              <a:buNone/>
-            </a:pPr>
-            <a:endParaRPr lang="es-MX" sz="3200" dirty="0"/>
-          </a:p>
-        </p:txBody>
-      </p:sp>
-    </p:spTree>
-    <p:extLst>
-      <p:ext uri="{BB962C8B-B14F-4D97-AF65-F5344CB8AC3E}">
-        <p14:creationId xmlns:p14="http://schemas.microsoft.com/office/powerpoint/2010/main" val="4018201288"/>
-      </p:ext>
-    </p:extLst>
-  </p:cSld>
-  <p:clrMapOvr>
-    <a:masterClrMapping/>
-  </p:clrMapOvr>
-  <mc:AlternateContent xmlns:mc="http://schemas.openxmlformats.org/markup-compatibility/2006" xmlns:p159="http://schemas.microsoft.com/office/powerpoint/2015/09/main">
-    <mc:Choice Requires="p159">
-      <p:transition spd="med">
-        <p159:morph option="byObject"/>
-      </p:transition>
-    </mc:Choice>
-    <mc:Fallback xmlns="">
-      <p:transition spd="med">
-        <p:fade/>
-      </p:transition>
-    </mc:Fallback>
-  </mc:AlternateContent>
-</p:sld>
-</file>
-
-<file path=ppt/slides/slide6.xml><?xml version="1.0" encoding="utf-8"?>
-<p:sld xmlns:a="http://schemas.openxmlformats.org/drawingml/2006/main" xmlns:r="http://schemas.openxmlformats.org/officeDocument/2006/relationships" xmlns:p="http://schemas.openxmlformats.org/presentationml/2006/main">
-  <p:cSld>
-    <p:spTree>
-      <p:nvGrpSpPr>
         <p:cNvPr id="1" name="">
           <a:extLst>
             <a:ext uri="{FF2B5EF4-FFF2-40B4-BE49-F238E27FC236}">
@@ -15718,7 +14877,7 @@
             </a:pPr>
             <a:r>
               <a:rPr lang="es-MX" sz="3200" dirty="0"/>
-              <a:t>CU18 – Crear Informe Mensual.</a:t>
+              <a:t>CU18 – Crear Informe Mensual</a:t>
             </a:r>
           </a:p>
           <a:p>
@@ -15728,7 +14887,7 @@
             </a:pPr>
             <a:r>
               <a:rPr lang="es-MX" sz="3200" dirty="0"/>
-              <a:t>CU20 – Registrar Usuario.</a:t>
+              <a:t>CU20 – Registrar Usuario</a:t>
             </a:r>
           </a:p>
           <a:p>
@@ -15738,7 +14897,7 @@
             </a:pPr>
             <a:r>
               <a:rPr lang="es-MX" sz="3200" dirty="0"/>
-              <a:t>CU21 – Modificar Usuario.</a:t>
+              <a:t>CU21 – Modificar Usuario</a:t>
             </a:r>
           </a:p>
           <a:p>
@@ -15748,7 +14907,7 @@
             </a:pPr>
             <a:r>
               <a:rPr lang="es-MX" sz="3200" dirty="0"/>
-              <a:t>CU22 – Eliminar Usuario.</a:t>
+              <a:t>CU22 – Eliminar Usuario</a:t>
             </a:r>
           </a:p>
           <a:p>
@@ -15795,7 +14954,764 @@
 </p:sld>
 </file>
 
-<file path=ppt/slides/slide7.xml><?xml version="1.0" encoding="utf-8"?>
+<file path=ppt/slides/slide21.xml><?xml version="1.0" encoding="utf-8"?>
+<p:sld xmlns:a="http://schemas.openxmlformats.org/drawingml/2006/main" xmlns:r="http://schemas.openxmlformats.org/officeDocument/2006/relationships" xmlns:p="http://schemas.openxmlformats.org/presentationml/2006/main">
+  <p:cSld>
+    <p:spTree>
+      <p:nvGrpSpPr>
+        <p:cNvPr id="1" name=""/>
+        <p:cNvGrpSpPr/>
+        <p:nvPr/>
+      </p:nvGrpSpPr>
+      <p:grpSpPr>
+        <a:xfrm>
+          <a:off x="0" y="0"/>
+          <a:ext cx="0" cy="0"/>
+          <a:chOff x="0" y="0"/>
+          <a:chExt cx="0" cy="0"/>
+        </a:xfrm>
+      </p:grpSpPr>
+      <p:pic>
+        <p:nvPicPr>
+          <p:cNvPr id="5" name="Picture 4" descr="A screenshot of a phone&#10;&#10;AI-generated content may be incorrect.">
+            <a:extLst>
+              <a:ext uri="{FF2B5EF4-FFF2-40B4-BE49-F238E27FC236}">
+                <a16:creationId xmlns:a16="http://schemas.microsoft.com/office/drawing/2014/main" id="{6A738C21-82EA-46A6-7A50-19920448CC28}"/>
+              </a:ext>
+            </a:extLst>
+          </p:cNvPr>
+          <p:cNvPicPr>
+            <a:picLocks noChangeAspect="1"/>
+          </p:cNvPicPr>
+          <p:nvPr/>
+        </p:nvPicPr>
+        <p:blipFill>
+          <a:blip r:embed="rId2">
+            <a:extLst>
+              <a:ext uri="{28A0092B-C50C-407E-A947-70E740481C1C}">
+                <a14:useLocalDpi xmlns:a14="http://schemas.microsoft.com/office/drawing/2010/main" val="0"/>
+              </a:ext>
+            </a:extLst>
+          </a:blip>
+          <a:stretch>
+            <a:fillRect/>
+          </a:stretch>
+        </p:blipFill>
+        <p:spPr>
+          <a:xfrm>
+            <a:off x="3491030" y="719831"/>
+            <a:ext cx="5209940" cy="5418337"/>
+          </a:xfrm>
+          <a:prstGeom prst="rect">
+            <a:avLst/>
+          </a:prstGeom>
+        </p:spPr>
+      </p:pic>
+    </p:spTree>
+    <p:extLst>
+      <p:ext uri="{BB962C8B-B14F-4D97-AF65-F5344CB8AC3E}">
+        <p14:creationId xmlns:p14="http://schemas.microsoft.com/office/powerpoint/2010/main" val="1685877545"/>
+      </p:ext>
+    </p:extLst>
+  </p:cSld>
+  <p:clrMapOvr>
+    <a:masterClrMapping/>
+  </p:clrMapOvr>
+  <mc:AlternateContent xmlns:mc="http://schemas.openxmlformats.org/markup-compatibility/2006" xmlns:p159="http://schemas.microsoft.com/office/powerpoint/2015/09/main">
+    <mc:Choice Requires="p159">
+      <p:transition spd="med">
+        <p159:morph option="byObject"/>
+      </p:transition>
+    </mc:Choice>
+    <mc:Fallback xmlns="">
+      <p:transition spd="med">
+        <p:fade/>
+      </p:transition>
+    </mc:Fallback>
+  </mc:AlternateContent>
+</p:sld>
+</file>
+
+<file path=ppt/slides/slide22.xml><?xml version="1.0" encoding="utf-8"?>
+<p:sld xmlns:a="http://schemas.openxmlformats.org/drawingml/2006/main" xmlns:r="http://schemas.openxmlformats.org/officeDocument/2006/relationships" xmlns:p="http://schemas.openxmlformats.org/presentationml/2006/main">
+  <p:cSld>
+    <p:spTree>
+      <p:nvGrpSpPr>
+        <p:cNvPr id="1" name=""/>
+        <p:cNvGrpSpPr/>
+        <p:nvPr/>
+      </p:nvGrpSpPr>
+      <p:grpSpPr>
+        <a:xfrm>
+          <a:off x="0" y="0"/>
+          <a:ext cx="0" cy="0"/>
+          <a:chOff x="0" y="0"/>
+          <a:chExt cx="0" cy="0"/>
+        </a:xfrm>
+      </p:grpSpPr>
+      <p:pic>
+        <p:nvPicPr>
+          <p:cNvPr id="5" name="Picture 4" descr="A screenshot of a website&#10;&#10;AI-generated content may be incorrect.">
+            <a:extLst>
+              <a:ext uri="{FF2B5EF4-FFF2-40B4-BE49-F238E27FC236}">
+                <a16:creationId xmlns:a16="http://schemas.microsoft.com/office/drawing/2014/main" id="{C8ABD960-1FF6-E9EA-7EAE-E3070F2137D1}"/>
+              </a:ext>
+            </a:extLst>
+          </p:cNvPr>
+          <p:cNvPicPr>
+            <a:picLocks noChangeAspect="1"/>
+          </p:cNvPicPr>
+          <p:nvPr/>
+        </p:nvPicPr>
+        <p:blipFill>
+          <a:blip r:embed="rId2">
+            <a:extLst>
+              <a:ext uri="{28A0092B-C50C-407E-A947-70E740481C1C}">
+                <a14:useLocalDpi xmlns:a14="http://schemas.microsoft.com/office/drawing/2010/main" val="0"/>
+              </a:ext>
+            </a:extLst>
+          </a:blip>
+          <a:stretch>
+            <a:fillRect/>
+          </a:stretch>
+        </p:blipFill>
+        <p:spPr>
+          <a:xfrm>
+            <a:off x="2313272" y="800077"/>
+            <a:ext cx="7565456" cy="5257846"/>
+          </a:xfrm>
+          <a:prstGeom prst="rect">
+            <a:avLst/>
+          </a:prstGeom>
+        </p:spPr>
+      </p:pic>
+    </p:spTree>
+    <p:extLst>
+      <p:ext uri="{BB962C8B-B14F-4D97-AF65-F5344CB8AC3E}">
+        <p14:creationId xmlns:p14="http://schemas.microsoft.com/office/powerpoint/2010/main" val="2352980928"/>
+      </p:ext>
+    </p:extLst>
+  </p:cSld>
+  <p:clrMapOvr>
+    <a:masterClrMapping/>
+  </p:clrMapOvr>
+  <mc:AlternateContent xmlns:mc="http://schemas.openxmlformats.org/markup-compatibility/2006" xmlns:p159="http://schemas.microsoft.com/office/powerpoint/2015/09/main">
+    <mc:Choice Requires="p159">
+      <p:transition spd="med">
+        <p159:morph option="byObject"/>
+      </p:transition>
+    </mc:Choice>
+    <mc:Fallback xmlns="">
+      <p:transition spd="med">
+        <p:fade/>
+      </p:transition>
+    </mc:Fallback>
+  </mc:AlternateContent>
+</p:sld>
+</file>
+
+<file path=ppt/slides/slide23.xml><?xml version="1.0" encoding="utf-8"?>
+<p:sld xmlns:a="http://schemas.openxmlformats.org/drawingml/2006/main" xmlns:r="http://schemas.openxmlformats.org/officeDocument/2006/relationships" xmlns:p="http://schemas.openxmlformats.org/presentationml/2006/main">
+  <p:cSld>
+    <p:spTree>
+      <p:nvGrpSpPr>
+        <p:cNvPr id="1" name=""/>
+        <p:cNvGrpSpPr/>
+        <p:nvPr/>
+      </p:nvGrpSpPr>
+      <p:grpSpPr>
+        <a:xfrm>
+          <a:off x="0" y="0"/>
+          <a:ext cx="0" cy="0"/>
+          <a:chOff x="0" y="0"/>
+          <a:chExt cx="0" cy="0"/>
+        </a:xfrm>
+      </p:grpSpPr>
+      <p:pic>
+        <p:nvPicPr>
+          <p:cNvPr id="5" name="Picture 4" descr="A screenshot of a computer&#10;&#10;AI-generated content may be incorrect.">
+            <a:extLst>
+              <a:ext uri="{FF2B5EF4-FFF2-40B4-BE49-F238E27FC236}">
+                <a16:creationId xmlns:a16="http://schemas.microsoft.com/office/drawing/2014/main" id="{15B8E83E-EA33-FCC7-D6D0-1811E2BFD03B}"/>
+              </a:ext>
+            </a:extLst>
+          </p:cNvPr>
+          <p:cNvPicPr>
+            <a:picLocks noChangeAspect="1"/>
+          </p:cNvPicPr>
+          <p:nvPr/>
+        </p:nvPicPr>
+        <p:blipFill>
+          <a:blip r:embed="rId2">
+            <a:extLst>
+              <a:ext uri="{28A0092B-C50C-407E-A947-70E740481C1C}">
+                <a14:useLocalDpi xmlns:a14="http://schemas.microsoft.com/office/drawing/2010/main" val="0"/>
+              </a:ext>
+            </a:extLst>
+          </a:blip>
+          <a:stretch>
+            <a:fillRect/>
+          </a:stretch>
+        </p:blipFill>
+        <p:spPr>
+          <a:xfrm>
+            <a:off x="0" y="1719461"/>
+            <a:ext cx="12192000" cy="3419077"/>
+          </a:xfrm>
+          <a:prstGeom prst="rect">
+            <a:avLst/>
+          </a:prstGeom>
+        </p:spPr>
+      </p:pic>
+    </p:spTree>
+    <p:extLst>
+      <p:ext uri="{BB962C8B-B14F-4D97-AF65-F5344CB8AC3E}">
+        <p14:creationId xmlns:p14="http://schemas.microsoft.com/office/powerpoint/2010/main" val="3061733579"/>
+      </p:ext>
+    </p:extLst>
+  </p:cSld>
+  <p:clrMapOvr>
+    <a:masterClrMapping/>
+  </p:clrMapOvr>
+  <mc:AlternateContent xmlns:mc="http://schemas.openxmlformats.org/markup-compatibility/2006" xmlns:p159="http://schemas.microsoft.com/office/powerpoint/2015/09/main">
+    <mc:Choice Requires="p159">
+      <p:transition spd="med">
+        <p159:morph option="byObject"/>
+      </p:transition>
+    </mc:Choice>
+    <mc:Fallback xmlns="">
+      <p:transition spd="med">
+        <p:fade/>
+      </p:transition>
+    </mc:Fallback>
+  </mc:AlternateContent>
+</p:sld>
+</file>
+
+<file path=ppt/slides/slide24.xml><?xml version="1.0" encoding="utf-8"?>
+<p:sld xmlns:a="http://schemas.openxmlformats.org/drawingml/2006/main" xmlns:r="http://schemas.openxmlformats.org/officeDocument/2006/relationships" xmlns:p="http://schemas.openxmlformats.org/presentationml/2006/main">
+  <p:cSld>
+    <p:spTree>
+      <p:nvGrpSpPr>
+        <p:cNvPr id="1" name=""/>
+        <p:cNvGrpSpPr/>
+        <p:nvPr/>
+      </p:nvGrpSpPr>
+      <p:grpSpPr>
+        <a:xfrm>
+          <a:off x="0" y="0"/>
+          <a:ext cx="0" cy="0"/>
+          <a:chOff x="0" y="0"/>
+          <a:chExt cx="0" cy="0"/>
+        </a:xfrm>
+      </p:grpSpPr>
+      <p:pic>
+        <p:nvPicPr>
+          <p:cNvPr id="5" name="Picture 4" descr="A screenshot of a computer screen&#10;&#10;AI-generated content may be incorrect.">
+            <a:extLst>
+              <a:ext uri="{FF2B5EF4-FFF2-40B4-BE49-F238E27FC236}">
+                <a16:creationId xmlns:a16="http://schemas.microsoft.com/office/drawing/2014/main" id="{952C2AA8-2D7B-BD16-3A31-64BC540E8E15}"/>
+              </a:ext>
+            </a:extLst>
+          </p:cNvPr>
+          <p:cNvPicPr>
+            <a:picLocks noChangeAspect="1"/>
+          </p:cNvPicPr>
+          <p:nvPr/>
+        </p:nvPicPr>
+        <p:blipFill>
+          <a:blip r:embed="rId2">
+            <a:extLst>
+              <a:ext uri="{28A0092B-C50C-407E-A947-70E740481C1C}">
+                <a14:useLocalDpi xmlns:a14="http://schemas.microsoft.com/office/drawing/2010/main" val="0"/>
+              </a:ext>
+            </a:extLst>
+          </a:blip>
+          <a:stretch>
+            <a:fillRect/>
+          </a:stretch>
+        </p:blipFill>
+        <p:spPr>
+          <a:xfrm>
+            <a:off x="3214662" y="968531"/>
+            <a:ext cx="5762676" cy="4920937"/>
+          </a:xfrm>
+          <a:prstGeom prst="rect">
+            <a:avLst/>
+          </a:prstGeom>
+        </p:spPr>
+      </p:pic>
+    </p:spTree>
+    <p:extLst>
+      <p:ext uri="{BB962C8B-B14F-4D97-AF65-F5344CB8AC3E}">
+        <p14:creationId xmlns:p14="http://schemas.microsoft.com/office/powerpoint/2010/main" val="272231400"/>
+      </p:ext>
+    </p:extLst>
+  </p:cSld>
+  <p:clrMapOvr>
+    <a:masterClrMapping/>
+  </p:clrMapOvr>
+  <mc:AlternateContent xmlns:mc="http://schemas.openxmlformats.org/markup-compatibility/2006" xmlns:p159="http://schemas.microsoft.com/office/powerpoint/2015/09/main">
+    <mc:Choice Requires="p159">
+      <p:transition spd="med">
+        <p159:morph option="byObject"/>
+      </p:transition>
+    </mc:Choice>
+    <mc:Fallback xmlns="">
+      <p:transition spd="med">
+        <p:fade/>
+      </p:transition>
+    </mc:Fallback>
+  </mc:AlternateContent>
+</p:sld>
+</file>
+
+<file path=ppt/slides/slide25.xml><?xml version="1.0" encoding="utf-8"?>
+<p:sld xmlns:a="http://schemas.openxmlformats.org/drawingml/2006/main" xmlns:r="http://schemas.openxmlformats.org/officeDocument/2006/relationships" xmlns:p="http://schemas.openxmlformats.org/presentationml/2006/main">
+  <p:cSld>
+    <p:spTree>
+      <p:nvGrpSpPr>
+        <p:cNvPr id="1" name=""/>
+        <p:cNvGrpSpPr/>
+        <p:nvPr/>
+      </p:nvGrpSpPr>
+      <p:grpSpPr>
+        <a:xfrm>
+          <a:off x="0" y="0"/>
+          <a:ext cx="0" cy="0"/>
+          <a:chOff x="0" y="0"/>
+          <a:chExt cx="0" cy="0"/>
+        </a:xfrm>
+      </p:grpSpPr>
+      <p:pic>
+        <p:nvPicPr>
+          <p:cNvPr id="5" name="Picture 4" descr="A screenshot of a computer screen&#10;&#10;AI-generated content may be incorrect.">
+            <a:extLst>
+              <a:ext uri="{FF2B5EF4-FFF2-40B4-BE49-F238E27FC236}">
+                <a16:creationId xmlns:a16="http://schemas.microsoft.com/office/drawing/2014/main" id="{11F717E4-FFA1-D36C-39C6-B310E3BFF06F}"/>
+              </a:ext>
+            </a:extLst>
+          </p:cNvPr>
+          <p:cNvPicPr>
+            <a:picLocks noChangeAspect="1"/>
+          </p:cNvPicPr>
+          <p:nvPr/>
+        </p:nvPicPr>
+        <p:blipFill>
+          <a:blip r:embed="rId2">
+            <a:extLst>
+              <a:ext uri="{28A0092B-C50C-407E-A947-70E740481C1C}">
+                <a14:useLocalDpi xmlns:a14="http://schemas.microsoft.com/office/drawing/2010/main" val="0"/>
+              </a:ext>
+            </a:extLst>
+          </a:blip>
+          <a:stretch>
+            <a:fillRect/>
+          </a:stretch>
+        </p:blipFill>
+        <p:spPr>
+          <a:xfrm>
+            <a:off x="2970623" y="830090"/>
+            <a:ext cx="6250754" cy="5197819"/>
+          </a:xfrm>
+          <a:prstGeom prst="rect">
+            <a:avLst/>
+          </a:prstGeom>
+        </p:spPr>
+      </p:pic>
+    </p:spTree>
+    <p:extLst>
+      <p:ext uri="{BB962C8B-B14F-4D97-AF65-F5344CB8AC3E}">
+        <p14:creationId xmlns:p14="http://schemas.microsoft.com/office/powerpoint/2010/main" val="3901318642"/>
+      </p:ext>
+    </p:extLst>
+  </p:cSld>
+  <p:clrMapOvr>
+    <a:masterClrMapping/>
+  </p:clrMapOvr>
+  <mc:AlternateContent xmlns:mc="http://schemas.openxmlformats.org/markup-compatibility/2006" xmlns:p159="http://schemas.microsoft.com/office/powerpoint/2015/09/main">
+    <mc:Choice Requires="p159">
+      <p:transition spd="med">
+        <p159:morph option="byObject"/>
+      </p:transition>
+    </mc:Choice>
+    <mc:Fallback xmlns="">
+      <p:transition spd="med">
+        <p:fade/>
+      </p:transition>
+    </mc:Fallback>
+  </mc:AlternateContent>
+</p:sld>
+</file>
+
+<file path=ppt/slides/slide26.xml><?xml version="1.0" encoding="utf-8"?>
+<p:sld xmlns:a="http://schemas.openxmlformats.org/drawingml/2006/main" xmlns:r="http://schemas.openxmlformats.org/officeDocument/2006/relationships" xmlns:p="http://schemas.openxmlformats.org/presentationml/2006/main">
+  <p:cSld>
+    <p:spTree>
+      <p:nvGrpSpPr>
+        <p:cNvPr id="1" name=""/>
+        <p:cNvGrpSpPr/>
+        <p:nvPr/>
+      </p:nvGrpSpPr>
+      <p:grpSpPr>
+        <a:xfrm>
+          <a:off x="0" y="0"/>
+          <a:ext cx="0" cy="0"/>
+          <a:chOff x="0" y="0"/>
+          <a:chExt cx="0" cy="0"/>
+        </a:xfrm>
+      </p:grpSpPr>
+      <p:pic>
+        <p:nvPicPr>
+          <p:cNvPr id="5" name="Picture 4" descr="A screenshot of a computer&#10;&#10;AI-generated content may be incorrect.">
+            <a:extLst>
+              <a:ext uri="{FF2B5EF4-FFF2-40B4-BE49-F238E27FC236}">
+                <a16:creationId xmlns:a16="http://schemas.microsoft.com/office/drawing/2014/main" id="{95A69E7A-7B9E-5EB4-A23D-2F1AFAE1C24A}"/>
+              </a:ext>
+            </a:extLst>
+          </p:cNvPr>
+          <p:cNvPicPr>
+            <a:picLocks noChangeAspect="1"/>
+          </p:cNvPicPr>
+          <p:nvPr/>
+        </p:nvPicPr>
+        <p:blipFill>
+          <a:blip r:embed="rId2">
+            <a:extLst>
+              <a:ext uri="{28A0092B-C50C-407E-A947-70E740481C1C}">
+                <a14:useLocalDpi xmlns:a14="http://schemas.microsoft.com/office/drawing/2010/main" val="0"/>
+              </a:ext>
+            </a:extLst>
+          </a:blip>
+          <a:stretch>
+            <a:fillRect/>
+          </a:stretch>
+        </p:blipFill>
+        <p:spPr>
+          <a:xfrm>
+            <a:off x="0" y="1990702"/>
+            <a:ext cx="12192000" cy="2876596"/>
+          </a:xfrm>
+          <a:prstGeom prst="rect">
+            <a:avLst/>
+          </a:prstGeom>
+        </p:spPr>
+      </p:pic>
+    </p:spTree>
+    <p:extLst>
+      <p:ext uri="{BB962C8B-B14F-4D97-AF65-F5344CB8AC3E}">
+        <p14:creationId xmlns:p14="http://schemas.microsoft.com/office/powerpoint/2010/main" val="2405566137"/>
+      </p:ext>
+    </p:extLst>
+  </p:cSld>
+  <p:clrMapOvr>
+    <a:masterClrMapping/>
+  </p:clrMapOvr>
+  <mc:AlternateContent xmlns:mc="http://schemas.openxmlformats.org/markup-compatibility/2006" xmlns:p159="http://schemas.microsoft.com/office/powerpoint/2015/09/main">
+    <mc:Choice Requires="p159">
+      <p:transition spd="med">
+        <p159:morph option="byObject"/>
+      </p:transition>
+    </mc:Choice>
+    <mc:Fallback xmlns="">
+      <p:transition spd="med">
+        <p:fade/>
+      </p:transition>
+    </mc:Fallback>
+  </mc:AlternateContent>
+</p:sld>
+</file>
+
+<file path=ppt/slides/slide27.xml><?xml version="1.0" encoding="utf-8"?>
+<p:sld xmlns:a="http://schemas.openxmlformats.org/drawingml/2006/main" xmlns:r="http://schemas.openxmlformats.org/officeDocument/2006/relationships" xmlns:p="http://schemas.openxmlformats.org/presentationml/2006/main">
+  <p:cSld>
+    <p:spTree>
+      <p:nvGrpSpPr>
+        <p:cNvPr id="1" name=""/>
+        <p:cNvGrpSpPr/>
+        <p:nvPr/>
+      </p:nvGrpSpPr>
+      <p:grpSpPr>
+        <a:xfrm>
+          <a:off x="0" y="0"/>
+          <a:ext cx="0" cy="0"/>
+          <a:chOff x="0" y="0"/>
+          <a:chExt cx="0" cy="0"/>
+        </a:xfrm>
+      </p:grpSpPr>
+      <p:pic>
+        <p:nvPicPr>
+          <p:cNvPr id="5" name="Picture 4" descr="A screenshot of a computer&#10;&#10;AI-generated content may be incorrect.">
+            <a:extLst>
+              <a:ext uri="{FF2B5EF4-FFF2-40B4-BE49-F238E27FC236}">
+                <a16:creationId xmlns:a16="http://schemas.microsoft.com/office/drawing/2014/main" id="{55D54B13-D9C5-03DD-0F1E-F7D355638CD7}"/>
+              </a:ext>
+            </a:extLst>
+          </p:cNvPr>
+          <p:cNvPicPr>
+            <a:picLocks noChangeAspect="1"/>
+          </p:cNvPicPr>
+          <p:nvPr/>
+        </p:nvPicPr>
+        <p:blipFill>
+          <a:blip r:embed="rId2">
+            <a:extLst>
+              <a:ext uri="{28A0092B-C50C-407E-A947-70E740481C1C}">
+                <a14:useLocalDpi xmlns:a14="http://schemas.microsoft.com/office/drawing/2010/main" val="0"/>
+              </a:ext>
+            </a:extLst>
+          </a:blip>
+          <a:stretch>
+            <a:fillRect/>
+          </a:stretch>
+        </p:blipFill>
+        <p:spPr>
+          <a:xfrm>
+            <a:off x="2475612" y="802573"/>
+            <a:ext cx="7240776" cy="5252854"/>
+          </a:xfrm>
+          <a:prstGeom prst="rect">
+            <a:avLst/>
+          </a:prstGeom>
+        </p:spPr>
+      </p:pic>
+    </p:spTree>
+    <p:extLst>
+      <p:ext uri="{BB962C8B-B14F-4D97-AF65-F5344CB8AC3E}">
+        <p14:creationId xmlns:p14="http://schemas.microsoft.com/office/powerpoint/2010/main" val="3890863436"/>
+      </p:ext>
+    </p:extLst>
+  </p:cSld>
+  <p:clrMapOvr>
+    <a:masterClrMapping/>
+  </p:clrMapOvr>
+  <mc:AlternateContent xmlns:mc="http://schemas.openxmlformats.org/markup-compatibility/2006" xmlns:p159="http://schemas.microsoft.com/office/powerpoint/2015/09/main">
+    <mc:Choice Requires="p159">
+      <p:transition spd="med">
+        <p159:morph option="byObject"/>
+      </p:transition>
+    </mc:Choice>
+    <mc:Fallback xmlns="">
+      <p:transition spd="med">
+        <p:fade/>
+      </p:transition>
+    </mc:Fallback>
+  </mc:AlternateContent>
+</p:sld>
+</file>
+
+<file path=ppt/slides/slide28.xml><?xml version="1.0" encoding="utf-8"?>
+<p:sld xmlns:a="http://schemas.openxmlformats.org/drawingml/2006/main" xmlns:r="http://schemas.openxmlformats.org/officeDocument/2006/relationships" xmlns:p="http://schemas.openxmlformats.org/presentationml/2006/main">
+  <p:cSld>
+    <p:spTree>
+      <p:nvGrpSpPr>
+        <p:cNvPr id="1" name="">
+          <a:extLst>
+            <a:ext uri="{FF2B5EF4-FFF2-40B4-BE49-F238E27FC236}">
+              <a16:creationId xmlns:a16="http://schemas.microsoft.com/office/drawing/2014/main" id="{8D093FA2-233D-9291-5131-C6DEC32854BE}"/>
+            </a:ext>
+          </a:extLst>
+        </p:cNvPr>
+        <p:cNvGrpSpPr/>
+        <p:nvPr/>
+      </p:nvGrpSpPr>
+      <p:grpSpPr>
+        <a:xfrm>
+          <a:off x="0" y="0"/>
+          <a:ext cx="0" cy="0"/>
+          <a:chOff x="0" y="0"/>
+          <a:chExt cx="0" cy="0"/>
+        </a:xfrm>
+      </p:grpSpPr>
+      <p:sp>
+        <p:nvSpPr>
+          <p:cNvPr id="2" name="Título 1">
+            <a:extLst>
+              <a:ext uri="{FF2B5EF4-FFF2-40B4-BE49-F238E27FC236}">
+                <a16:creationId xmlns:a16="http://schemas.microsoft.com/office/drawing/2014/main" id="{08D965E4-8491-CB02-E5A4-12D68ACE8061}"/>
+              </a:ext>
+            </a:extLst>
+          </p:cNvPr>
+          <p:cNvSpPr>
+            <a:spLocks noGrp="1"/>
+          </p:cNvSpPr>
+          <p:nvPr>
+            <p:ph type="title"/>
+          </p:nvPr>
+        </p:nvSpPr>
+        <p:spPr>
+          <a:xfrm>
+            <a:off x="838200" y="2766218"/>
+            <a:ext cx="10515600" cy="1325563"/>
+          </a:xfrm>
+        </p:spPr>
+        <p:txBody>
+          <a:bodyPr>
+            <a:normAutofit/>
+          </a:bodyPr>
+          <a:lstStyle/>
+          <a:p>
+            <a:pPr algn="ctr"/>
+            <a:r>
+              <a:rPr lang="es-MX" sz="7200" b="1" dirty="0">
+                <a:solidFill>
+                  <a:schemeClr val="accent5"/>
+                </a:solidFill>
+              </a:rPr>
+              <a:t>Diagramas</a:t>
+            </a:r>
+            <a:endParaRPr lang="es-AR" sz="7200" b="1" dirty="0">
+              <a:solidFill>
+                <a:schemeClr val="accent5"/>
+              </a:solidFill>
+            </a:endParaRPr>
+          </a:p>
+        </p:txBody>
+      </p:sp>
+    </p:spTree>
+    <p:extLst>
+      <p:ext uri="{BB962C8B-B14F-4D97-AF65-F5344CB8AC3E}">
+        <p14:creationId xmlns:p14="http://schemas.microsoft.com/office/powerpoint/2010/main" val="3210059093"/>
+      </p:ext>
+    </p:extLst>
+  </p:cSld>
+  <p:clrMapOvr>
+    <a:masterClrMapping/>
+  </p:clrMapOvr>
+  <mc:AlternateContent xmlns:mc="http://schemas.openxmlformats.org/markup-compatibility/2006" xmlns:p159="http://schemas.microsoft.com/office/powerpoint/2015/09/main">
+    <mc:Choice Requires="p159">
+      <p:transition spd="med">
+        <p159:morph option="byObject"/>
+      </p:transition>
+    </mc:Choice>
+    <mc:Fallback xmlns="">
+      <p:transition spd="med">
+        <p:fade/>
+      </p:transition>
+    </mc:Fallback>
+  </mc:AlternateContent>
+</p:sld>
+</file>
+
+<file path=ppt/slides/slide29.xml><?xml version="1.0" encoding="utf-8"?>
+<p:sld xmlns:a="http://schemas.openxmlformats.org/drawingml/2006/main" xmlns:r="http://schemas.openxmlformats.org/officeDocument/2006/relationships" xmlns:p="http://schemas.openxmlformats.org/presentationml/2006/main">
+  <p:cSld>
+    <p:spTree>
+      <p:nvGrpSpPr>
+        <p:cNvPr id="1" name=""/>
+        <p:cNvGrpSpPr/>
+        <p:nvPr/>
+      </p:nvGrpSpPr>
+      <p:grpSpPr>
+        <a:xfrm>
+          <a:off x="0" y="0"/>
+          <a:ext cx="0" cy="0"/>
+          <a:chOff x="0" y="0"/>
+          <a:chExt cx="0" cy="0"/>
+        </a:xfrm>
+      </p:grpSpPr>
+      <p:pic>
+        <p:nvPicPr>
+          <p:cNvPr id="7" name="Picture 6" descr="A diagram of a computer&#10;&#10;AI-generated content may be incorrect.">
+            <a:extLst>
+              <a:ext uri="{FF2B5EF4-FFF2-40B4-BE49-F238E27FC236}">
+                <a16:creationId xmlns:a16="http://schemas.microsoft.com/office/drawing/2014/main" id="{A4E91633-49B2-8152-4720-A9A8A602A0E6}"/>
+              </a:ext>
+            </a:extLst>
+          </p:cNvPr>
+          <p:cNvPicPr>
+            <a:picLocks noChangeAspect="1"/>
+          </p:cNvPicPr>
+          <p:nvPr/>
+        </p:nvPicPr>
+        <p:blipFill>
+          <a:blip r:embed="rId2">
+            <a:extLst>
+              <a:ext uri="{28A0092B-C50C-407E-A947-70E740481C1C}">
+                <a14:useLocalDpi xmlns:a14="http://schemas.microsoft.com/office/drawing/2010/main" val="0"/>
+              </a:ext>
+            </a:extLst>
+          </a:blip>
+          <a:stretch>
+            <a:fillRect/>
+          </a:stretch>
+        </p:blipFill>
+        <p:spPr>
+          <a:xfrm>
+            <a:off x="1625774" y="0"/>
+            <a:ext cx="8940452" cy="6858000"/>
+          </a:xfrm>
+          <a:prstGeom prst="rect">
+            <a:avLst/>
+          </a:prstGeom>
+        </p:spPr>
+      </p:pic>
+      <p:sp>
+        <p:nvSpPr>
+          <p:cNvPr id="8" name="TextBox 7">
+            <a:extLst>
+              <a:ext uri="{FF2B5EF4-FFF2-40B4-BE49-F238E27FC236}">
+                <a16:creationId xmlns:a16="http://schemas.microsoft.com/office/drawing/2014/main" id="{81B5224D-3675-7CD6-00F5-C2EBF044467F}"/>
+              </a:ext>
+            </a:extLst>
+          </p:cNvPr>
+          <p:cNvSpPr txBox="1"/>
+          <p:nvPr/>
+        </p:nvSpPr>
+        <p:spPr>
+          <a:xfrm>
+            <a:off x="401216" y="373224"/>
+            <a:ext cx="3697359" cy="523220"/>
+          </a:xfrm>
+          <a:prstGeom prst="rect">
+            <a:avLst/>
+          </a:prstGeom>
+          <a:noFill/>
+        </p:spPr>
+        <p:txBody>
+          <a:bodyPr wrap="none" rtlCol="0">
+            <a:spAutoFit/>
+          </a:bodyPr>
+          <a:lstStyle/>
+          <a:p>
+            <a:r>
+              <a:rPr lang="es-MX" sz="2800" b="1" dirty="0">
+                <a:solidFill>
+                  <a:schemeClr val="accent5"/>
+                </a:solidFill>
+              </a:rPr>
+              <a:t>Diagrama de Dominio</a:t>
+            </a:r>
+            <a:endParaRPr lang="es-AR" sz="2800" dirty="0"/>
+          </a:p>
+        </p:txBody>
+      </p:sp>
+    </p:spTree>
+    <p:extLst>
+      <p:ext uri="{BB962C8B-B14F-4D97-AF65-F5344CB8AC3E}">
+        <p14:creationId xmlns:p14="http://schemas.microsoft.com/office/powerpoint/2010/main" val="2795754154"/>
+      </p:ext>
+    </p:extLst>
+  </p:cSld>
+  <p:clrMapOvr>
+    <a:masterClrMapping/>
+  </p:clrMapOvr>
+  <mc:AlternateContent xmlns:mc="http://schemas.openxmlformats.org/markup-compatibility/2006" xmlns:p159="http://schemas.microsoft.com/office/powerpoint/2015/09/main">
+    <mc:Choice Requires="p159">
+      <p:transition spd="med">
+        <p159:morph option="byObject"/>
+      </p:transition>
+    </mc:Choice>
+    <mc:Fallback xmlns="">
+      <p:transition spd="med">
+        <p:fade/>
+      </p:transition>
+    </mc:Fallback>
+  </mc:AlternateContent>
+</p:sld>
+</file>
+
+<file path=ppt/slides/slide3.xml><?xml version="1.0" encoding="utf-8"?>
 <p:sld xmlns:a="http://schemas.openxmlformats.org/drawingml/2006/main" xmlns:r="http://schemas.openxmlformats.org/officeDocument/2006/relationships" xmlns:p="http://schemas.openxmlformats.org/presentationml/2006/main">
   <p:cSld>
     <p:spTree>
@@ -15888,7 +15804,1078 @@
 </p:sld>
 </file>
 
-<file path=ppt/slides/slide8.xml><?xml version="1.0" encoding="utf-8"?>
+<file path=ppt/slides/slide30.xml><?xml version="1.0" encoding="utf-8"?>
+<p:sld xmlns:a="http://schemas.openxmlformats.org/drawingml/2006/main" xmlns:r="http://schemas.openxmlformats.org/officeDocument/2006/relationships" xmlns:p="http://schemas.openxmlformats.org/presentationml/2006/main">
+  <p:cSld>
+    <p:spTree>
+      <p:nvGrpSpPr>
+        <p:cNvPr id="1" name=""/>
+        <p:cNvGrpSpPr/>
+        <p:nvPr/>
+      </p:nvGrpSpPr>
+      <p:grpSpPr>
+        <a:xfrm>
+          <a:off x="0" y="0"/>
+          <a:ext cx="0" cy="0"/>
+          <a:chOff x="0" y="0"/>
+          <a:chExt cx="0" cy="0"/>
+        </a:xfrm>
+      </p:grpSpPr>
+      <p:pic>
+        <p:nvPicPr>
+          <p:cNvPr id="5" name="Picture 4" descr="A diagram of a computer&#10;&#10;AI-generated content may be incorrect.">
+            <a:extLst>
+              <a:ext uri="{FF2B5EF4-FFF2-40B4-BE49-F238E27FC236}">
+                <a16:creationId xmlns:a16="http://schemas.microsoft.com/office/drawing/2014/main" id="{E11DE771-721A-5424-2C31-8CCB49580B41}"/>
+              </a:ext>
+            </a:extLst>
+          </p:cNvPr>
+          <p:cNvPicPr>
+            <a:picLocks noChangeAspect="1"/>
+          </p:cNvPicPr>
+          <p:nvPr/>
+        </p:nvPicPr>
+        <p:blipFill>
+          <a:blip r:embed="rId2">
+            <a:extLst>
+              <a:ext uri="{28A0092B-C50C-407E-A947-70E740481C1C}">
+                <a14:useLocalDpi xmlns:a14="http://schemas.microsoft.com/office/drawing/2010/main" val="0"/>
+              </a:ext>
+            </a:extLst>
+          </a:blip>
+          <a:stretch>
+            <a:fillRect/>
+          </a:stretch>
+        </p:blipFill>
+        <p:spPr>
+          <a:xfrm>
+            <a:off x="293117" y="664143"/>
+            <a:ext cx="11605765" cy="6193857"/>
+          </a:xfrm>
+          <a:prstGeom prst="rect">
+            <a:avLst/>
+          </a:prstGeom>
+        </p:spPr>
+      </p:pic>
+      <p:sp>
+        <p:nvSpPr>
+          <p:cNvPr id="6" name="TextBox 5">
+            <a:extLst>
+              <a:ext uri="{FF2B5EF4-FFF2-40B4-BE49-F238E27FC236}">
+                <a16:creationId xmlns:a16="http://schemas.microsoft.com/office/drawing/2014/main" id="{64BC767F-1703-8F98-5C88-4C2650C0ED27}"/>
+              </a:ext>
+            </a:extLst>
+          </p:cNvPr>
+          <p:cNvSpPr txBox="1"/>
+          <p:nvPr/>
+        </p:nvSpPr>
+        <p:spPr>
+          <a:xfrm>
+            <a:off x="410841" y="402533"/>
+            <a:ext cx="2262671" cy="523220"/>
+          </a:xfrm>
+          <a:prstGeom prst="rect">
+            <a:avLst/>
+          </a:prstGeom>
+          <a:noFill/>
+        </p:spPr>
+        <p:txBody>
+          <a:bodyPr wrap="none" rtlCol="0">
+            <a:spAutoFit/>
+          </a:bodyPr>
+          <a:lstStyle/>
+          <a:p>
+            <a:r>
+              <a:rPr lang="es-MX" sz="2800" b="1" dirty="0">
+                <a:solidFill>
+                  <a:schemeClr val="accent5"/>
+                </a:solidFill>
+              </a:rPr>
+              <a:t>Diagrama ER</a:t>
+            </a:r>
+            <a:endParaRPr lang="es-AR" sz="2800" dirty="0"/>
+          </a:p>
+        </p:txBody>
+      </p:sp>
+    </p:spTree>
+    <p:extLst>
+      <p:ext uri="{BB962C8B-B14F-4D97-AF65-F5344CB8AC3E}">
+        <p14:creationId xmlns:p14="http://schemas.microsoft.com/office/powerpoint/2010/main" val="1831330011"/>
+      </p:ext>
+    </p:extLst>
+  </p:cSld>
+  <p:clrMapOvr>
+    <a:masterClrMapping/>
+  </p:clrMapOvr>
+  <mc:AlternateContent xmlns:mc="http://schemas.openxmlformats.org/markup-compatibility/2006" xmlns:p159="http://schemas.microsoft.com/office/powerpoint/2015/09/main">
+    <mc:Choice Requires="p159">
+      <p:transition spd="med">
+        <p159:morph option="byObject"/>
+      </p:transition>
+    </mc:Choice>
+    <mc:Fallback xmlns="">
+      <p:transition spd="med">
+        <p:fade/>
+      </p:transition>
+    </mc:Fallback>
+  </mc:AlternateContent>
+</p:sld>
+</file>
+
+<file path=ppt/slides/slide31.xml><?xml version="1.0" encoding="utf-8"?>
+<p:sld xmlns:a="http://schemas.openxmlformats.org/drawingml/2006/main" xmlns:r="http://schemas.openxmlformats.org/officeDocument/2006/relationships" xmlns:p="http://schemas.openxmlformats.org/presentationml/2006/main">
+  <p:cSld>
+    <p:spTree>
+      <p:nvGrpSpPr>
+        <p:cNvPr id="1" name=""/>
+        <p:cNvGrpSpPr/>
+        <p:nvPr/>
+      </p:nvGrpSpPr>
+      <p:grpSpPr>
+        <a:xfrm>
+          <a:off x="0" y="0"/>
+          <a:ext cx="0" cy="0"/>
+          <a:chOff x="0" y="0"/>
+          <a:chExt cx="0" cy="0"/>
+        </a:xfrm>
+      </p:grpSpPr>
+      <p:pic>
+        <p:nvPicPr>
+          <p:cNvPr id="5" name="Picture 4" descr="A diagram of a company&#10;&#10;AI-generated content may be incorrect.">
+            <a:extLst>
+              <a:ext uri="{FF2B5EF4-FFF2-40B4-BE49-F238E27FC236}">
+                <a16:creationId xmlns:a16="http://schemas.microsoft.com/office/drawing/2014/main" id="{06A8B8ED-797D-A10A-52E1-6BBE7EEC3214}"/>
+              </a:ext>
+            </a:extLst>
+          </p:cNvPr>
+          <p:cNvPicPr>
+            <a:picLocks noChangeAspect="1"/>
+          </p:cNvPicPr>
+          <p:nvPr/>
+        </p:nvPicPr>
+        <p:blipFill>
+          <a:blip r:embed="rId2">
+            <a:extLst>
+              <a:ext uri="{28A0092B-C50C-407E-A947-70E740481C1C}">
+                <a14:useLocalDpi xmlns:a14="http://schemas.microsoft.com/office/drawing/2010/main" val="0"/>
+              </a:ext>
+            </a:extLst>
+          </a:blip>
+          <a:stretch>
+            <a:fillRect/>
+          </a:stretch>
+        </p:blipFill>
+        <p:spPr>
+          <a:xfrm>
+            <a:off x="4183455" y="1"/>
+            <a:ext cx="3825089" cy="6857999"/>
+          </a:xfrm>
+          <a:prstGeom prst="rect">
+            <a:avLst/>
+          </a:prstGeom>
+        </p:spPr>
+      </p:pic>
+      <p:sp>
+        <p:nvSpPr>
+          <p:cNvPr id="6" name="TextBox 5">
+            <a:extLst>
+              <a:ext uri="{FF2B5EF4-FFF2-40B4-BE49-F238E27FC236}">
+                <a16:creationId xmlns:a16="http://schemas.microsoft.com/office/drawing/2014/main" id="{13D6592A-E3AA-A4F9-707D-6B6A1D1CE2FE}"/>
+              </a:ext>
+            </a:extLst>
+          </p:cNvPr>
+          <p:cNvSpPr txBox="1"/>
+          <p:nvPr/>
+        </p:nvSpPr>
+        <p:spPr>
+          <a:xfrm>
+            <a:off x="410841" y="402533"/>
+            <a:ext cx="3997530" cy="954107"/>
+          </a:xfrm>
+          <a:prstGeom prst="rect">
+            <a:avLst/>
+          </a:prstGeom>
+          <a:noFill/>
+        </p:spPr>
+        <p:txBody>
+          <a:bodyPr wrap="square" rtlCol="0">
+            <a:spAutoFit/>
+          </a:bodyPr>
+          <a:lstStyle/>
+          <a:p>
+            <a:r>
+              <a:rPr lang="es-MX" sz="2800" b="1" dirty="0">
+                <a:solidFill>
+                  <a:schemeClr val="accent5"/>
+                </a:solidFill>
+              </a:rPr>
+              <a:t>Diagrama de Estados:</a:t>
+            </a:r>
+            <a:br>
+              <a:rPr lang="es-MX" sz="2800" b="1" dirty="0">
+                <a:solidFill>
+                  <a:schemeClr val="accent5"/>
+                </a:solidFill>
+              </a:rPr>
+            </a:br>
+            <a:r>
+              <a:rPr lang="es-MX" sz="2800" b="1" dirty="0">
+                <a:solidFill>
+                  <a:schemeClr val="accent5"/>
+                </a:solidFill>
+              </a:rPr>
+              <a:t>Registrar Paciente</a:t>
+            </a:r>
+            <a:endParaRPr lang="es-AR" sz="2800" dirty="0"/>
+          </a:p>
+        </p:txBody>
+      </p:sp>
+    </p:spTree>
+    <p:extLst>
+      <p:ext uri="{BB962C8B-B14F-4D97-AF65-F5344CB8AC3E}">
+        <p14:creationId xmlns:p14="http://schemas.microsoft.com/office/powerpoint/2010/main" val="550851345"/>
+      </p:ext>
+    </p:extLst>
+  </p:cSld>
+  <p:clrMapOvr>
+    <a:masterClrMapping/>
+  </p:clrMapOvr>
+  <mc:AlternateContent xmlns:mc="http://schemas.openxmlformats.org/markup-compatibility/2006" xmlns:p159="http://schemas.microsoft.com/office/powerpoint/2015/09/main">
+    <mc:Choice Requires="p159">
+      <p:transition spd="med">
+        <p159:morph option="byObject"/>
+      </p:transition>
+    </mc:Choice>
+    <mc:Fallback xmlns="">
+      <p:transition spd="med">
+        <p:fade/>
+      </p:transition>
+    </mc:Fallback>
+  </mc:AlternateContent>
+</p:sld>
+</file>
+
+<file path=ppt/slides/slide32.xml><?xml version="1.0" encoding="utf-8"?>
+<p:sld xmlns:a="http://schemas.openxmlformats.org/drawingml/2006/main" xmlns:r="http://schemas.openxmlformats.org/officeDocument/2006/relationships" xmlns:p="http://schemas.openxmlformats.org/presentationml/2006/main">
+  <p:cSld>
+    <p:spTree>
+      <p:nvGrpSpPr>
+        <p:cNvPr id="1" name=""/>
+        <p:cNvGrpSpPr/>
+        <p:nvPr/>
+      </p:nvGrpSpPr>
+      <p:grpSpPr>
+        <a:xfrm>
+          <a:off x="0" y="0"/>
+          <a:ext cx="0" cy="0"/>
+          <a:chOff x="0" y="0"/>
+          <a:chExt cx="0" cy="0"/>
+        </a:xfrm>
+      </p:grpSpPr>
+      <p:pic>
+        <p:nvPicPr>
+          <p:cNvPr id="5" name="Picture 4" descr="A diagram of a patient&#10;&#10;AI-generated content may be incorrect.">
+            <a:extLst>
+              <a:ext uri="{FF2B5EF4-FFF2-40B4-BE49-F238E27FC236}">
+                <a16:creationId xmlns:a16="http://schemas.microsoft.com/office/drawing/2014/main" id="{09E3592D-C097-C285-74A2-75761117EE58}"/>
+              </a:ext>
+            </a:extLst>
+          </p:cNvPr>
+          <p:cNvPicPr>
+            <a:picLocks noChangeAspect="1"/>
+          </p:cNvPicPr>
+          <p:nvPr/>
+        </p:nvPicPr>
+        <p:blipFill>
+          <a:blip r:embed="rId2">
+            <a:extLst>
+              <a:ext uri="{28A0092B-C50C-407E-A947-70E740481C1C}">
+                <a14:useLocalDpi xmlns:a14="http://schemas.microsoft.com/office/drawing/2010/main" val="0"/>
+              </a:ext>
+            </a:extLst>
+          </a:blip>
+          <a:stretch>
+            <a:fillRect/>
+          </a:stretch>
+        </p:blipFill>
+        <p:spPr>
+          <a:xfrm>
+            <a:off x="2577353" y="0"/>
+            <a:ext cx="7037294" cy="6858000"/>
+          </a:xfrm>
+          <a:prstGeom prst="rect">
+            <a:avLst/>
+          </a:prstGeom>
+        </p:spPr>
+      </p:pic>
+      <p:sp>
+        <p:nvSpPr>
+          <p:cNvPr id="6" name="TextBox 5">
+            <a:extLst>
+              <a:ext uri="{FF2B5EF4-FFF2-40B4-BE49-F238E27FC236}">
+                <a16:creationId xmlns:a16="http://schemas.microsoft.com/office/drawing/2014/main" id="{25A4692E-34ED-A3E4-5881-BC20F2298029}"/>
+              </a:ext>
+            </a:extLst>
+          </p:cNvPr>
+          <p:cNvSpPr txBox="1"/>
+          <p:nvPr/>
+        </p:nvSpPr>
+        <p:spPr>
+          <a:xfrm>
+            <a:off x="401216" y="344781"/>
+            <a:ext cx="3997530" cy="954107"/>
+          </a:xfrm>
+          <a:prstGeom prst="rect">
+            <a:avLst/>
+          </a:prstGeom>
+          <a:noFill/>
+        </p:spPr>
+        <p:txBody>
+          <a:bodyPr wrap="square" rtlCol="0">
+            <a:spAutoFit/>
+          </a:bodyPr>
+          <a:lstStyle/>
+          <a:p>
+            <a:r>
+              <a:rPr lang="es-MX" sz="2800" b="1" dirty="0">
+                <a:solidFill>
+                  <a:schemeClr val="accent5"/>
+                </a:solidFill>
+              </a:rPr>
+              <a:t>Diagrama de Estados:</a:t>
+            </a:r>
+            <a:br>
+              <a:rPr lang="es-MX" sz="2800" b="1" dirty="0">
+                <a:solidFill>
+                  <a:schemeClr val="accent5"/>
+                </a:solidFill>
+              </a:rPr>
+            </a:br>
+            <a:r>
+              <a:rPr lang="es-MX" sz="2800" b="1" dirty="0">
+                <a:solidFill>
+                  <a:schemeClr val="accent5"/>
+                </a:solidFill>
+              </a:rPr>
+              <a:t>Asignar Turno</a:t>
+            </a:r>
+            <a:endParaRPr lang="es-AR" sz="2800" dirty="0"/>
+          </a:p>
+        </p:txBody>
+      </p:sp>
+    </p:spTree>
+    <p:extLst>
+      <p:ext uri="{BB962C8B-B14F-4D97-AF65-F5344CB8AC3E}">
+        <p14:creationId xmlns:p14="http://schemas.microsoft.com/office/powerpoint/2010/main" val="3774963023"/>
+      </p:ext>
+    </p:extLst>
+  </p:cSld>
+  <p:clrMapOvr>
+    <a:masterClrMapping/>
+  </p:clrMapOvr>
+  <mc:AlternateContent xmlns:mc="http://schemas.openxmlformats.org/markup-compatibility/2006" xmlns:p159="http://schemas.microsoft.com/office/powerpoint/2015/09/main">
+    <mc:Choice Requires="p159">
+      <p:transition spd="med">
+        <p159:morph option="byObject"/>
+      </p:transition>
+    </mc:Choice>
+    <mc:Fallback xmlns="">
+      <p:transition spd="med">
+        <p:fade/>
+      </p:transition>
+    </mc:Fallback>
+  </mc:AlternateContent>
+</p:sld>
+</file>
+
+<file path=ppt/slides/slide33.xml><?xml version="1.0" encoding="utf-8"?>
+<p:sld xmlns:a="http://schemas.openxmlformats.org/drawingml/2006/main" xmlns:r="http://schemas.openxmlformats.org/officeDocument/2006/relationships" xmlns:p="http://schemas.openxmlformats.org/presentationml/2006/main">
+  <p:cSld>
+    <p:spTree>
+      <p:nvGrpSpPr>
+        <p:cNvPr id="1" name=""/>
+        <p:cNvGrpSpPr/>
+        <p:nvPr/>
+      </p:nvGrpSpPr>
+      <p:grpSpPr>
+        <a:xfrm>
+          <a:off x="0" y="0"/>
+          <a:ext cx="0" cy="0"/>
+          <a:chOff x="0" y="0"/>
+          <a:chExt cx="0" cy="0"/>
+        </a:xfrm>
+      </p:grpSpPr>
+      <p:pic>
+        <p:nvPicPr>
+          <p:cNvPr id="5" name="Picture 4" descr="A diagram of a company&#10;&#10;AI-generated content may be incorrect.">
+            <a:extLst>
+              <a:ext uri="{FF2B5EF4-FFF2-40B4-BE49-F238E27FC236}">
+                <a16:creationId xmlns:a16="http://schemas.microsoft.com/office/drawing/2014/main" id="{88C6AFD8-D145-6398-9C9C-5EC5C0F9B9F6}"/>
+              </a:ext>
+            </a:extLst>
+          </p:cNvPr>
+          <p:cNvPicPr>
+            <a:picLocks noChangeAspect="1"/>
+          </p:cNvPicPr>
+          <p:nvPr/>
+        </p:nvPicPr>
+        <p:blipFill>
+          <a:blip r:embed="rId2">
+            <a:extLst>
+              <a:ext uri="{28A0092B-C50C-407E-A947-70E740481C1C}">
+                <a14:useLocalDpi xmlns:a14="http://schemas.microsoft.com/office/drawing/2010/main" val="0"/>
+              </a:ext>
+            </a:extLst>
+          </a:blip>
+          <a:stretch>
+            <a:fillRect/>
+          </a:stretch>
+        </p:blipFill>
+        <p:spPr>
+          <a:xfrm>
+            <a:off x="3722795" y="0"/>
+            <a:ext cx="4746409" cy="6858000"/>
+          </a:xfrm>
+          <a:prstGeom prst="rect">
+            <a:avLst/>
+          </a:prstGeom>
+        </p:spPr>
+      </p:pic>
+      <p:sp>
+        <p:nvSpPr>
+          <p:cNvPr id="6" name="TextBox 5">
+            <a:extLst>
+              <a:ext uri="{FF2B5EF4-FFF2-40B4-BE49-F238E27FC236}">
+                <a16:creationId xmlns:a16="http://schemas.microsoft.com/office/drawing/2014/main" id="{487E0CFE-1929-21F2-279A-BB1E05A0D6F5}"/>
+              </a:ext>
+            </a:extLst>
+          </p:cNvPr>
+          <p:cNvSpPr txBox="1"/>
+          <p:nvPr/>
+        </p:nvSpPr>
+        <p:spPr>
+          <a:xfrm>
+            <a:off x="381965" y="392907"/>
+            <a:ext cx="4746409" cy="523220"/>
+          </a:xfrm>
+          <a:prstGeom prst="rect">
+            <a:avLst/>
+          </a:prstGeom>
+          <a:noFill/>
+        </p:spPr>
+        <p:txBody>
+          <a:bodyPr wrap="square" rtlCol="0">
+            <a:spAutoFit/>
+          </a:bodyPr>
+          <a:lstStyle/>
+          <a:p>
+            <a:r>
+              <a:rPr lang="es-MX" sz="2800" b="1" dirty="0">
+                <a:solidFill>
+                  <a:schemeClr val="accent5"/>
+                </a:solidFill>
+              </a:rPr>
+              <a:t>Diagrama de Estados: Turno</a:t>
+            </a:r>
+            <a:endParaRPr lang="es-AR" sz="2800" dirty="0"/>
+          </a:p>
+        </p:txBody>
+      </p:sp>
+    </p:spTree>
+    <p:extLst>
+      <p:ext uri="{BB962C8B-B14F-4D97-AF65-F5344CB8AC3E}">
+        <p14:creationId xmlns:p14="http://schemas.microsoft.com/office/powerpoint/2010/main" val="2831033403"/>
+      </p:ext>
+    </p:extLst>
+  </p:cSld>
+  <p:clrMapOvr>
+    <a:masterClrMapping/>
+  </p:clrMapOvr>
+  <mc:AlternateContent xmlns:mc="http://schemas.openxmlformats.org/markup-compatibility/2006" xmlns:p159="http://schemas.microsoft.com/office/powerpoint/2015/09/main">
+    <mc:Choice Requires="p159">
+      <p:transition spd="med">
+        <p159:morph option="byObject"/>
+      </p:transition>
+    </mc:Choice>
+    <mc:Fallback xmlns="">
+      <p:transition spd="med">
+        <p:fade/>
+      </p:transition>
+    </mc:Fallback>
+  </mc:AlternateContent>
+</p:sld>
+</file>
+
+<file path=ppt/slides/slide34.xml><?xml version="1.0" encoding="utf-8"?>
+<p:sld xmlns:a="http://schemas.openxmlformats.org/drawingml/2006/main" xmlns:r="http://schemas.openxmlformats.org/officeDocument/2006/relationships" xmlns:p="http://schemas.openxmlformats.org/presentationml/2006/main">
+  <p:cSld>
+    <p:spTree>
+      <p:nvGrpSpPr>
+        <p:cNvPr id="1" name=""/>
+        <p:cNvGrpSpPr/>
+        <p:nvPr/>
+      </p:nvGrpSpPr>
+      <p:grpSpPr>
+        <a:xfrm>
+          <a:off x="0" y="0"/>
+          <a:ext cx="0" cy="0"/>
+          <a:chOff x="0" y="0"/>
+          <a:chExt cx="0" cy="0"/>
+        </a:xfrm>
+      </p:grpSpPr>
+      <p:pic>
+        <p:nvPicPr>
+          <p:cNvPr id="5" name="Picture 4" descr="A diagram of a company&#10;&#10;AI-generated content may be incorrect.">
+            <a:extLst>
+              <a:ext uri="{FF2B5EF4-FFF2-40B4-BE49-F238E27FC236}">
+                <a16:creationId xmlns:a16="http://schemas.microsoft.com/office/drawing/2014/main" id="{21433FAE-BEAC-55F7-38E7-5A70C81DC169}"/>
+              </a:ext>
+            </a:extLst>
+          </p:cNvPr>
+          <p:cNvPicPr>
+            <a:picLocks noChangeAspect="1"/>
+          </p:cNvPicPr>
+          <p:nvPr/>
+        </p:nvPicPr>
+        <p:blipFill>
+          <a:blip r:embed="rId2">
+            <a:extLst>
+              <a:ext uri="{28A0092B-C50C-407E-A947-70E740481C1C}">
+                <a14:useLocalDpi xmlns:a14="http://schemas.microsoft.com/office/drawing/2010/main" val="0"/>
+              </a:ext>
+            </a:extLst>
+          </a:blip>
+          <a:stretch>
+            <a:fillRect/>
+          </a:stretch>
+        </p:blipFill>
+        <p:spPr>
+          <a:xfrm>
+            <a:off x="0" y="1139536"/>
+            <a:ext cx="12192000" cy="5579954"/>
+          </a:xfrm>
+          <a:prstGeom prst="rect">
+            <a:avLst/>
+          </a:prstGeom>
+        </p:spPr>
+      </p:pic>
+      <p:sp>
+        <p:nvSpPr>
+          <p:cNvPr id="6" name="TextBox 5">
+            <a:extLst>
+              <a:ext uri="{FF2B5EF4-FFF2-40B4-BE49-F238E27FC236}">
+                <a16:creationId xmlns:a16="http://schemas.microsoft.com/office/drawing/2014/main" id="{A2169ABD-95C2-59A1-E457-C95EE3D28F4E}"/>
+              </a:ext>
+            </a:extLst>
+          </p:cNvPr>
+          <p:cNvSpPr txBox="1"/>
+          <p:nvPr/>
+        </p:nvSpPr>
+        <p:spPr>
+          <a:xfrm>
+            <a:off x="333838" y="383282"/>
+            <a:ext cx="4746409" cy="523220"/>
+          </a:xfrm>
+          <a:prstGeom prst="rect">
+            <a:avLst/>
+          </a:prstGeom>
+          <a:noFill/>
+        </p:spPr>
+        <p:txBody>
+          <a:bodyPr wrap="square" rtlCol="0">
+            <a:spAutoFit/>
+          </a:bodyPr>
+          <a:lstStyle/>
+          <a:p>
+            <a:r>
+              <a:rPr lang="es-MX" sz="2800" b="1" dirty="0">
+                <a:solidFill>
+                  <a:schemeClr val="accent5"/>
+                </a:solidFill>
+              </a:rPr>
+              <a:t>Diagrama de Componentes</a:t>
+            </a:r>
+            <a:endParaRPr lang="es-AR" sz="2800" dirty="0"/>
+          </a:p>
+        </p:txBody>
+      </p:sp>
+    </p:spTree>
+    <p:extLst>
+      <p:ext uri="{BB962C8B-B14F-4D97-AF65-F5344CB8AC3E}">
+        <p14:creationId xmlns:p14="http://schemas.microsoft.com/office/powerpoint/2010/main" val="3095768530"/>
+      </p:ext>
+    </p:extLst>
+  </p:cSld>
+  <p:clrMapOvr>
+    <a:masterClrMapping/>
+  </p:clrMapOvr>
+  <mc:AlternateContent xmlns:mc="http://schemas.openxmlformats.org/markup-compatibility/2006" xmlns:p159="http://schemas.microsoft.com/office/powerpoint/2015/09/main">
+    <mc:Choice Requires="p159">
+      <p:transition spd="med">
+        <p159:morph option="byObject"/>
+      </p:transition>
+    </mc:Choice>
+    <mc:Fallback xmlns="">
+      <p:transition spd="med">
+        <p:fade/>
+      </p:transition>
+    </mc:Fallback>
+  </mc:AlternateContent>
+</p:sld>
+</file>
+
+<file path=ppt/slides/slide35.xml><?xml version="1.0" encoding="utf-8"?>
+<p:sld xmlns:a="http://schemas.openxmlformats.org/drawingml/2006/main" xmlns:r="http://schemas.openxmlformats.org/officeDocument/2006/relationships" xmlns:p="http://schemas.openxmlformats.org/presentationml/2006/main">
+  <p:cSld>
+    <p:spTree>
+      <p:nvGrpSpPr>
+        <p:cNvPr id="1" name=""/>
+        <p:cNvGrpSpPr/>
+        <p:nvPr/>
+      </p:nvGrpSpPr>
+      <p:grpSpPr>
+        <a:xfrm>
+          <a:off x="0" y="0"/>
+          <a:ext cx="0" cy="0"/>
+          <a:chOff x="0" y="0"/>
+          <a:chExt cx="0" cy="0"/>
+        </a:xfrm>
+      </p:grpSpPr>
+      <p:pic>
+        <p:nvPicPr>
+          <p:cNvPr id="5" name="Picture 4" descr="A close-up of a logo&#10;&#10;AI-generated content may be incorrect.">
+            <a:extLst>
+              <a:ext uri="{FF2B5EF4-FFF2-40B4-BE49-F238E27FC236}">
+                <a16:creationId xmlns:a16="http://schemas.microsoft.com/office/drawing/2014/main" id="{C9EEEE8D-6656-D75A-AF05-08131A6F2E6C}"/>
+              </a:ext>
+            </a:extLst>
+          </p:cNvPr>
+          <p:cNvPicPr>
+            <a:picLocks noChangeAspect="1"/>
+          </p:cNvPicPr>
+          <p:nvPr/>
+        </p:nvPicPr>
+        <p:blipFill>
+          <a:blip r:embed="rId2">
+            <a:extLst>
+              <a:ext uri="{28A0092B-C50C-407E-A947-70E740481C1C}">
+                <a14:useLocalDpi xmlns:a14="http://schemas.microsoft.com/office/drawing/2010/main" val="0"/>
+              </a:ext>
+            </a:extLst>
+          </a:blip>
+          <a:stretch>
+            <a:fillRect/>
+          </a:stretch>
+        </p:blipFill>
+        <p:spPr>
+          <a:xfrm>
+            <a:off x="202120" y="1546233"/>
+            <a:ext cx="11787759" cy="3765534"/>
+          </a:xfrm>
+          <a:prstGeom prst="rect">
+            <a:avLst/>
+          </a:prstGeom>
+        </p:spPr>
+      </p:pic>
+      <p:sp>
+        <p:nvSpPr>
+          <p:cNvPr id="6" name="TextBox 5">
+            <a:extLst>
+              <a:ext uri="{FF2B5EF4-FFF2-40B4-BE49-F238E27FC236}">
+                <a16:creationId xmlns:a16="http://schemas.microsoft.com/office/drawing/2014/main" id="{88647607-2AF0-AF1A-E6B8-8151DC8E5D31}"/>
+              </a:ext>
+            </a:extLst>
+          </p:cNvPr>
+          <p:cNvSpPr txBox="1"/>
+          <p:nvPr/>
+        </p:nvSpPr>
+        <p:spPr>
+          <a:xfrm>
+            <a:off x="343464" y="489160"/>
+            <a:ext cx="4746409" cy="523220"/>
+          </a:xfrm>
+          <a:prstGeom prst="rect">
+            <a:avLst/>
+          </a:prstGeom>
+          <a:noFill/>
+        </p:spPr>
+        <p:txBody>
+          <a:bodyPr wrap="square" rtlCol="0">
+            <a:spAutoFit/>
+          </a:bodyPr>
+          <a:lstStyle/>
+          <a:p>
+            <a:r>
+              <a:rPr lang="es-MX" sz="2800" b="1" dirty="0">
+                <a:solidFill>
+                  <a:schemeClr val="accent5"/>
+                </a:solidFill>
+              </a:rPr>
+              <a:t>Diagrama de Arquitectura</a:t>
+            </a:r>
+            <a:endParaRPr lang="es-AR" sz="2800" dirty="0"/>
+          </a:p>
+        </p:txBody>
+      </p:sp>
+    </p:spTree>
+    <p:extLst>
+      <p:ext uri="{BB962C8B-B14F-4D97-AF65-F5344CB8AC3E}">
+        <p14:creationId xmlns:p14="http://schemas.microsoft.com/office/powerpoint/2010/main" val="2247602145"/>
+      </p:ext>
+    </p:extLst>
+  </p:cSld>
+  <p:clrMapOvr>
+    <a:masterClrMapping/>
+  </p:clrMapOvr>
+  <mc:AlternateContent xmlns:mc="http://schemas.openxmlformats.org/markup-compatibility/2006" xmlns:p159="http://schemas.microsoft.com/office/powerpoint/2015/09/main">
+    <mc:Choice Requires="p159">
+      <p:transition spd="med">
+        <p159:morph option="byObject"/>
+      </p:transition>
+    </mc:Choice>
+    <mc:Fallback xmlns="">
+      <p:transition spd="med">
+        <p:fade/>
+      </p:transition>
+    </mc:Fallback>
+  </mc:AlternateContent>
+</p:sld>
+</file>
+
+<file path=ppt/slides/slide36.xml><?xml version="1.0" encoding="utf-8"?>
+<p:sld xmlns:a="http://schemas.openxmlformats.org/drawingml/2006/main" xmlns:r="http://schemas.openxmlformats.org/officeDocument/2006/relationships" xmlns:p="http://schemas.openxmlformats.org/presentationml/2006/main">
+  <p:cSld>
+    <p:spTree>
+      <p:nvGrpSpPr>
+        <p:cNvPr id="1" name=""/>
+        <p:cNvGrpSpPr/>
+        <p:nvPr/>
+      </p:nvGrpSpPr>
+      <p:grpSpPr>
+        <a:xfrm>
+          <a:off x="0" y="0"/>
+          <a:ext cx="0" cy="0"/>
+          <a:chOff x="0" y="0"/>
+          <a:chExt cx="0" cy="0"/>
+        </a:xfrm>
+      </p:grpSpPr>
+      <p:sp>
+        <p:nvSpPr>
+          <p:cNvPr id="4" name="TextBox 3">
+            <a:extLst>
+              <a:ext uri="{FF2B5EF4-FFF2-40B4-BE49-F238E27FC236}">
+                <a16:creationId xmlns:a16="http://schemas.microsoft.com/office/drawing/2014/main" id="{B0F00AD9-DA18-F3E6-842A-68F496FB5AE8}"/>
+              </a:ext>
+            </a:extLst>
+          </p:cNvPr>
+          <p:cNvSpPr txBox="1"/>
+          <p:nvPr/>
+        </p:nvSpPr>
+        <p:spPr>
+          <a:xfrm>
+            <a:off x="353089" y="575788"/>
+            <a:ext cx="4746409" cy="523220"/>
+          </a:xfrm>
+          <a:prstGeom prst="rect">
+            <a:avLst/>
+          </a:prstGeom>
+          <a:noFill/>
+        </p:spPr>
+        <p:txBody>
+          <a:bodyPr wrap="square" rtlCol="0">
+            <a:spAutoFit/>
+          </a:bodyPr>
+          <a:lstStyle/>
+          <a:p>
+            <a:r>
+              <a:rPr lang="es-MX" sz="2800" b="1" dirty="0">
+                <a:solidFill>
+                  <a:schemeClr val="accent5"/>
+                </a:solidFill>
+              </a:rPr>
+              <a:t>Diagrama de Despliegue</a:t>
+            </a:r>
+            <a:endParaRPr lang="es-AR" sz="2800" dirty="0"/>
+          </a:p>
+        </p:txBody>
+      </p:sp>
+      <p:pic>
+        <p:nvPicPr>
+          <p:cNvPr id="6" name="Picture 5" descr="A pink sign with a gear and text&#10;&#10;AI-generated content may be incorrect.">
+            <a:extLst>
+              <a:ext uri="{FF2B5EF4-FFF2-40B4-BE49-F238E27FC236}">
+                <a16:creationId xmlns:a16="http://schemas.microsoft.com/office/drawing/2014/main" id="{171A30CD-77BE-F205-D8CF-83568DA3945E}"/>
+              </a:ext>
+            </a:extLst>
+          </p:cNvPr>
+          <p:cNvPicPr>
+            <a:picLocks noChangeAspect="1"/>
+          </p:cNvPicPr>
+          <p:nvPr/>
+        </p:nvPicPr>
+        <p:blipFill>
+          <a:blip r:embed="rId2">
+            <a:extLst>
+              <a:ext uri="{28A0092B-C50C-407E-A947-70E740481C1C}">
+                <a14:useLocalDpi xmlns:a14="http://schemas.microsoft.com/office/drawing/2010/main" val="0"/>
+              </a:ext>
+            </a:extLst>
+          </a:blip>
+          <a:stretch>
+            <a:fillRect/>
+          </a:stretch>
+        </p:blipFill>
+        <p:spPr>
+          <a:xfrm>
+            <a:off x="2245823" y="2494647"/>
+            <a:ext cx="7700353" cy="1868705"/>
+          </a:xfrm>
+          <a:prstGeom prst="rect">
+            <a:avLst/>
+          </a:prstGeom>
+        </p:spPr>
+      </p:pic>
+    </p:spTree>
+    <p:extLst>
+      <p:ext uri="{BB962C8B-B14F-4D97-AF65-F5344CB8AC3E}">
+        <p14:creationId xmlns:p14="http://schemas.microsoft.com/office/powerpoint/2010/main" val="1655993064"/>
+      </p:ext>
+    </p:extLst>
+  </p:cSld>
+  <p:clrMapOvr>
+    <a:masterClrMapping/>
+  </p:clrMapOvr>
+  <mc:AlternateContent xmlns:mc="http://schemas.openxmlformats.org/markup-compatibility/2006" xmlns:p159="http://schemas.microsoft.com/office/powerpoint/2015/09/main">
+    <mc:Choice Requires="p159">
+      <p:transition spd="med">
+        <p159:morph option="byObject"/>
+      </p:transition>
+    </mc:Choice>
+    <mc:Fallback xmlns="">
+      <p:transition spd="med">
+        <p:fade/>
+      </p:transition>
+    </mc:Fallback>
+  </mc:AlternateContent>
+</p:sld>
+</file>
+
+<file path=ppt/slides/slide37.xml><?xml version="1.0" encoding="utf-8"?>
+<p:sld xmlns:a="http://schemas.openxmlformats.org/drawingml/2006/main" xmlns:r="http://schemas.openxmlformats.org/officeDocument/2006/relationships" xmlns:p="http://schemas.openxmlformats.org/presentationml/2006/main">
+  <p:cSld>
+    <p:spTree>
+      <p:nvGrpSpPr>
+        <p:cNvPr id="1" name=""/>
+        <p:cNvGrpSpPr/>
+        <p:nvPr/>
+      </p:nvGrpSpPr>
+      <p:grpSpPr>
+        <a:xfrm>
+          <a:off x="0" y="0"/>
+          <a:ext cx="0" cy="0"/>
+          <a:chOff x="0" y="0"/>
+          <a:chExt cx="0" cy="0"/>
+        </a:xfrm>
+      </p:grpSpPr>
+      <p:sp>
+        <p:nvSpPr>
+          <p:cNvPr id="4" name="Título 1">
+            <a:extLst>
+              <a:ext uri="{FF2B5EF4-FFF2-40B4-BE49-F238E27FC236}">
+                <a16:creationId xmlns:a16="http://schemas.microsoft.com/office/drawing/2014/main" id="{E8BB9829-14AE-CA6A-CB9F-AFE4EB75D2A2}"/>
+              </a:ext>
+            </a:extLst>
+          </p:cNvPr>
+          <p:cNvSpPr>
+            <a:spLocks noGrp="1"/>
+          </p:cNvSpPr>
+          <p:nvPr>
+            <p:ph type="title"/>
+          </p:nvPr>
+        </p:nvSpPr>
+        <p:spPr>
+          <a:xfrm>
+            <a:off x="838200" y="2766218"/>
+            <a:ext cx="10515600" cy="1325563"/>
+          </a:xfrm>
+        </p:spPr>
+        <p:txBody>
+          <a:bodyPr>
+            <a:normAutofit/>
+          </a:bodyPr>
+          <a:lstStyle/>
+          <a:p>
+            <a:pPr algn="ctr"/>
+            <a:r>
+              <a:rPr lang="es-MX" sz="7200" b="1" dirty="0">
+                <a:solidFill>
+                  <a:schemeClr val="accent5"/>
+                </a:solidFill>
+              </a:rPr>
+              <a:t>¡MUCHAS GRACIAS!</a:t>
+            </a:r>
+            <a:endParaRPr lang="es-AR" sz="7200" b="1" dirty="0">
+              <a:solidFill>
+                <a:schemeClr val="accent5"/>
+              </a:solidFill>
+            </a:endParaRPr>
+          </a:p>
+        </p:txBody>
+      </p:sp>
+    </p:spTree>
+    <p:extLst>
+      <p:ext uri="{BB962C8B-B14F-4D97-AF65-F5344CB8AC3E}">
+        <p14:creationId xmlns:p14="http://schemas.microsoft.com/office/powerpoint/2010/main" val="2160946102"/>
+      </p:ext>
+    </p:extLst>
+  </p:cSld>
+  <p:clrMapOvr>
+    <a:masterClrMapping/>
+  </p:clrMapOvr>
+  <mc:AlternateContent xmlns:mc="http://schemas.openxmlformats.org/markup-compatibility/2006" xmlns:p159="http://schemas.microsoft.com/office/powerpoint/2015/09/main">
+    <mc:Choice Requires="p159">
+      <p:transition spd="med">
+        <p159:morph option="byObject"/>
+      </p:transition>
+    </mc:Choice>
+    <mc:Fallback xmlns="">
+      <p:transition spd="med">
+        <p:fade/>
+      </p:transition>
+    </mc:Fallback>
+  </mc:AlternateContent>
+</p:sld>
+</file>
+
+<file path=ppt/slides/slide4.xml><?xml version="1.0" encoding="utf-8"?>
+<p:sld xmlns:a="http://schemas.openxmlformats.org/drawingml/2006/main" xmlns:r="http://schemas.openxmlformats.org/officeDocument/2006/relationships" xmlns:p="http://schemas.openxmlformats.org/presentationml/2006/main">
+  <p:cSld>
+    <p:spTree>
+      <p:nvGrpSpPr>
+        <p:cNvPr id="1" name=""/>
+        <p:cNvGrpSpPr/>
+        <p:nvPr/>
+      </p:nvGrpSpPr>
+      <p:grpSpPr>
+        <a:xfrm>
+          <a:off x="0" y="0"/>
+          <a:ext cx="0" cy="0"/>
+          <a:chOff x="0" y="0"/>
+          <a:chExt cx="0" cy="0"/>
+        </a:xfrm>
+      </p:grpSpPr>
+      <p:pic>
+        <p:nvPicPr>
+          <p:cNvPr id="4" name="Content Placeholder 3">
+            <a:extLst>
+              <a:ext uri="{FF2B5EF4-FFF2-40B4-BE49-F238E27FC236}">
+                <a16:creationId xmlns:a16="http://schemas.microsoft.com/office/drawing/2014/main" id="{4CDCD51D-82C4-DBE7-CBF1-8E0C8CDE2CA6}"/>
+              </a:ext>
+            </a:extLst>
+          </p:cNvPr>
+          <p:cNvPicPr>
+            <a:picLocks noGrp="1" noChangeAspect="1"/>
+          </p:cNvPicPr>
+          <p:nvPr>
+            <p:ph idx="1"/>
+          </p:nvPr>
+        </p:nvPicPr>
+        <p:blipFill>
+          <a:blip r:embed="rId2">
+            <a:extLst>
+              <a:ext uri="{28A0092B-C50C-407E-A947-70E740481C1C}">
+                <a14:useLocalDpi xmlns:a14="http://schemas.microsoft.com/office/drawing/2010/main" val="0"/>
+              </a:ext>
+            </a:extLst>
+          </a:blip>
+          <a:srcRect/>
+          <a:stretch>
+            <a:fillRect/>
+          </a:stretch>
+        </p:blipFill>
+        <p:spPr bwMode="auto">
+          <a:xfrm>
+            <a:off x="1991205" y="559132"/>
+            <a:ext cx="9154850" cy="5938516"/>
+          </a:xfrm>
+          <a:prstGeom prst="rect">
+            <a:avLst/>
+          </a:prstGeom>
+          <a:noFill/>
+          <a:ln>
+            <a:noFill/>
+          </a:ln>
+        </p:spPr>
+      </p:pic>
+      <p:sp>
+        <p:nvSpPr>
+          <p:cNvPr id="6" name="Título 1">
+            <a:extLst>
+              <a:ext uri="{FF2B5EF4-FFF2-40B4-BE49-F238E27FC236}">
+                <a16:creationId xmlns:a16="http://schemas.microsoft.com/office/drawing/2014/main" id="{1E36BF5B-6D64-6ED8-E7F3-840766302043}"/>
+              </a:ext>
+            </a:extLst>
+          </p:cNvPr>
+          <p:cNvSpPr>
+            <a:spLocks noGrp="1"/>
+          </p:cNvSpPr>
+          <p:nvPr>
+            <p:ph type="title"/>
+          </p:nvPr>
+        </p:nvSpPr>
+        <p:spPr>
+          <a:xfrm>
+            <a:off x="269405" y="360352"/>
+            <a:ext cx="3276600" cy="1325563"/>
+          </a:xfrm>
+        </p:spPr>
+        <p:txBody>
+          <a:bodyPr/>
+          <a:lstStyle/>
+          <a:p>
+            <a:pPr algn="ctr"/>
+            <a:r>
+              <a:rPr lang="es-MX" b="1" dirty="0">
+                <a:solidFill>
+                  <a:schemeClr val="accent5"/>
+                </a:solidFill>
+              </a:rPr>
+              <a:t>Secretario</a:t>
+            </a:r>
+            <a:endParaRPr lang="es-AR" b="1" dirty="0">
+              <a:solidFill>
+                <a:schemeClr val="accent5"/>
+              </a:solidFill>
+            </a:endParaRPr>
+          </a:p>
+        </p:txBody>
+      </p:sp>
+    </p:spTree>
+    <p:extLst>
+      <p:ext uri="{BB962C8B-B14F-4D97-AF65-F5344CB8AC3E}">
+        <p14:creationId xmlns:p14="http://schemas.microsoft.com/office/powerpoint/2010/main" val="1560920494"/>
+      </p:ext>
+    </p:extLst>
+  </p:cSld>
+  <p:clrMapOvr>
+    <a:masterClrMapping/>
+  </p:clrMapOvr>
+  <mc:AlternateContent xmlns:mc="http://schemas.openxmlformats.org/markup-compatibility/2006" xmlns:p159="http://schemas.microsoft.com/office/powerpoint/2015/09/main">
+    <mc:Choice Requires="p159">
+      <p:transition spd="med">
+        <p159:morph option="byObject"/>
+      </p:transition>
+    </mc:Choice>
+    <mc:Fallback xmlns="">
+      <p:transition spd="med">
+        <p:fade/>
+      </p:transition>
+    </mc:Fallback>
+  </mc:AlternateContent>
+</p:sld>
+</file>
+
+<file path=ppt/slides/slide5.xml><?xml version="1.0" encoding="utf-8"?>
 <p:sld xmlns:a="http://schemas.openxmlformats.org/drawingml/2006/main" xmlns:r="http://schemas.openxmlformats.org/officeDocument/2006/relationships" xmlns:p="http://schemas.openxmlformats.org/presentationml/2006/main">
   <p:cSld>
     <p:spTree>
@@ -16009,6 +16996,427 @@
 </p:sld>
 </file>
 
+<file path=ppt/slides/slide6.xml><?xml version="1.0" encoding="utf-8"?>
+<p:sld xmlns:a="http://schemas.openxmlformats.org/drawingml/2006/main" xmlns:r="http://schemas.openxmlformats.org/officeDocument/2006/relationships" xmlns:p="http://schemas.openxmlformats.org/presentationml/2006/main">
+  <p:cSld>
+    <p:spTree>
+      <p:nvGrpSpPr>
+        <p:cNvPr id="1" name=""/>
+        <p:cNvGrpSpPr/>
+        <p:nvPr/>
+      </p:nvGrpSpPr>
+      <p:grpSpPr>
+        <a:xfrm>
+          <a:off x="0" y="0"/>
+          <a:ext cx="0" cy="0"/>
+          <a:chOff x="0" y="0"/>
+          <a:chExt cx="0" cy="0"/>
+        </a:xfrm>
+      </p:grpSpPr>
+      <p:pic>
+        <p:nvPicPr>
+          <p:cNvPr id="2" name="Picture 1">
+            <a:extLst>
+              <a:ext uri="{FF2B5EF4-FFF2-40B4-BE49-F238E27FC236}">
+                <a16:creationId xmlns:a16="http://schemas.microsoft.com/office/drawing/2014/main" id="{7803A98C-BC3D-944F-91A7-38E0EE126A0F}"/>
+              </a:ext>
+            </a:extLst>
+          </p:cNvPr>
+          <p:cNvPicPr>
+            <a:picLocks noChangeAspect="1"/>
+          </p:cNvPicPr>
+          <p:nvPr/>
+        </p:nvPicPr>
+        <p:blipFill>
+          <a:blip r:embed="rId2">
+            <a:extLst>
+              <a:ext uri="{28A0092B-C50C-407E-A947-70E740481C1C}">
+                <a14:useLocalDpi xmlns:a14="http://schemas.microsoft.com/office/drawing/2010/main" val="0"/>
+              </a:ext>
+            </a:extLst>
+          </a:blip>
+          <a:srcRect/>
+          <a:stretch>
+            <a:fillRect/>
+          </a:stretch>
+        </p:blipFill>
+        <p:spPr bwMode="auto">
+          <a:xfrm>
+            <a:off x="2110639" y="646047"/>
+            <a:ext cx="8323146" cy="6049721"/>
+          </a:xfrm>
+          <a:prstGeom prst="rect">
+            <a:avLst/>
+          </a:prstGeom>
+          <a:noFill/>
+          <a:ln>
+            <a:noFill/>
+          </a:ln>
+        </p:spPr>
+      </p:pic>
+      <p:sp>
+        <p:nvSpPr>
+          <p:cNvPr id="8" name="Título 1">
+            <a:extLst>
+              <a:ext uri="{FF2B5EF4-FFF2-40B4-BE49-F238E27FC236}">
+                <a16:creationId xmlns:a16="http://schemas.microsoft.com/office/drawing/2014/main" id="{FC9651F5-A991-D856-0684-3B01A1566DDB}"/>
+              </a:ext>
+            </a:extLst>
+          </p:cNvPr>
+          <p:cNvSpPr>
+            <a:spLocks noGrp="1"/>
+          </p:cNvSpPr>
+          <p:nvPr>
+            <p:ph type="title"/>
+          </p:nvPr>
+        </p:nvSpPr>
+        <p:spPr>
+          <a:xfrm>
+            <a:off x="166734" y="-203528"/>
+            <a:ext cx="3601556" cy="1325563"/>
+          </a:xfrm>
+        </p:spPr>
+        <p:txBody>
+          <a:bodyPr/>
+          <a:lstStyle/>
+          <a:p>
+            <a:pPr algn="ctr"/>
+            <a:r>
+              <a:rPr lang="es-MX" b="1" dirty="0">
+                <a:solidFill>
+                  <a:schemeClr val="accent5"/>
+                </a:solidFill>
+              </a:rPr>
+              <a:t>Administrador</a:t>
+            </a:r>
+            <a:endParaRPr lang="es-AR" b="1" dirty="0">
+              <a:solidFill>
+                <a:schemeClr val="accent5"/>
+              </a:solidFill>
+            </a:endParaRPr>
+          </a:p>
+        </p:txBody>
+      </p:sp>
+    </p:spTree>
+    <p:extLst>
+      <p:ext uri="{BB962C8B-B14F-4D97-AF65-F5344CB8AC3E}">
+        <p14:creationId xmlns:p14="http://schemas.microsoft.com/office/powerpoint/2010/main" val="2720912390"/>
+      </p:ext>
+    </p:extLst>
+  </p:cSld>
+  <p:clrMapOvr>
+    <a:masterClrMapping/>
+  </p:clrMapOvr>
+  <mc:AlternateContent xmlns:mc="http://schemas.openxmlformats.org/markup-compatibility/2006" xmlns:p159="http://schemas.microsoft.com/office/powerpoint/2015/09/main">
+    <mc:Choice Requires="p159">
+      <p:transition spd="med">
+        <p159:morph option="byObject"/>
+      </p:transition>
+    </mc:Choice>
+    <mc:Fallback xmlns="">
+      <p:transition spd="med">
+        <p:fade/>
+      </p:transition>
+    </mc:Fallback>
+  </mc:AlternateContent>
+</p:sld>
+</file>
+
+<file path=ppt/slides/slide7.xml><?xml version="1.0" encoding="utf-8"?>
+<p:sld xmlns:a="http://schemas.openxmlformats.org/drawingml/2006/main" xmlns:r="http://schemas.openxmlformats.org/officeDocument/2006/relationships" xmlns:p="http://schemas.openxmlformats.org/presentationml/2006/main">
+  <p:cSld>
+    <p:spTree>
+      <p:nvGrpSpPr>
+        <p:cNvPr id="1" name=""/>
+        <p:cNvGrpSpPr/>
+        <p:nvPr/>
+      </p:nvGrpSpPr>
+      <p:grpSpPr>
+        <a:xfrm>
+          <a:off x="0" y="0"/>
+          <a:ext cx="0" cy="0"/>
+          <a:chOff x="0" y="0"/>
+          <a:chExt cx="0" cy="0"/>
+        </a:xfrm>
+      </p:grpSpPr>
+      <p:sp>
+        <p:nvSpPr>
+          <p:cNvPr id="2" name="Título 1">
+            <a:extLst>
+              <a:ext uri="{FF2B5EF4-FFF2-40B4-BE49-F238E27FC236}">
+                <a16:creationId xmlns:a16="http://schemas.microsoft.com/office/drawing/2014/main" id="{7591DDE4-C63E-CD77-1DB2-E7F0F7ED0E75}"/>
+              </a:ext>
+            </a:extLst>
+          </p:cNvPr>
+          <p:cNvSpPr>
+            <a:spLocks noGrp="1"/>
+          </p:cNvSpPr>
+          <p:nvPr>
+            <p:ph type="title"/>
+          </p:nvPr>
+        </p:nvSpPr>
+        <p:spPr>
+          <a:xfrm>
+            <a:off x="838200" y="1524841"/>
+            <a:ext cx="10515600" cy="3808317"/>
+          </a:xfrm>
+        </p:spPr>
+        <p:txBody>
+          <a:bodyPr>
+            <a:normAutofit fontScale="90000"/>
+          </a:bodyPr>
+          <a:lstStyle/>
+          <a:p>
+            <a:pPr algn="ctr"/>
+            <a:r>
+              <a:rPr lang="es-MX" sz="7200" b="1" dirty="0">
+                <a:solidFill>
+                  <a:schemeClr val="accent5"/>
+                </a:solidFill>
+              </a:rPr>
+              <a:t>Roles,  </a:t>
+            </a:r>
+            <a:br>
+              <a:rPr lang="es-MX" sz="7200" b="1" dirty="0">
+                <a:solidFill>
+                  <a:schemeClr val="accent5"/>
+                </a:solidFill>
+              </a:rPr>
+            </a:br>
+            <a:r>
+              <a:rPr lang="es-MX" sz="7200" b="1" dirty="0">
+                <a:solidFill>
+                  <a:schemeClr val="accent5"/>
+                </a:solidFill>
+              </a:rPr>
+              <a:t>Casos de Uso Principales</a:t>
+            </a:r>
+            <a:br>
+              <a:rPr lang="es-MX" sz="7200" b="1" dirty="0">
+                <a:solidFill>
+                  <a:schemeClr val="accent5"/>
+                </a:solidFill>
+              </a:rPr>
+            </a:br>
+            <a:r>
+              <a:rPr lang="es-MX" sz="7200" b="1" dirty="0">
+                <a:solidFill>
+                  <a:schemeClr val="accent5"/>
+                </a:solidFill>
+              </a:rPr>
+              <a:t>y</a:t>
+            </a:r>
+            <a:br>
+              <a:rPr lang="es-MX" sz="7200" b="1" dirty="0">
+                <a:solidFill>
+                  <a:schemeClr val="accent5"/>
+                </a:solidFill>
+              </a:rPr>
+            </a:br>
+            <a:r>
+              <a:rPr lang="es-MX" sz="7200" b="1" dirty="0">
+                <a:solidFill>
+                  <a:schemeClr val="accent5"/>
+                </a:solidFill>
+              </a:rPr>
+              <a:t>Pantallas</a:t>
+            </a:r>
+            <a:endParaRPr lang="es-AR" sz="7200" b="1" dirty="0">
+              <a:solidFill>
+                <a:schemeClr val="accent5"/>
+              </a:solidFill>
+            </a:endParaRPr>
+          </a:p>
+        </p:txBody>
+      </p:sp>
+    </p:spTree>
+    <p:extLst>
+      <p:ext uri="{BB962C8B-B14F-4D97-AF65-F5344CB8AC3E}">
+        <p14:creationId xmlns:p14="http://schemas.microsoft.com/office/powerpoint/2010/main" val="2559050008"/>
+      </p:ext>
+    </p:extLst>
+  </p:cSld>
+  <p:clrMapOvr>
+    <a:masterClrMapping/>
+  </p:clrMapOvr>
+  <mc:AlternateContent xmlns:mc="http://schemas.openxmlformats.org/markup-compatibility/2006" xmlns:p159="http://schemas.microsoft.com/office/powerpoint/2015/09/main">
+    <mc:Choice Requires="p159">
+      <p:transition spd="med">
+        <p159:morph option="byObject"/>
+      </p:transition>
+    </mc:Choice>
+    <mc:Fallback xmlns="">
+      <p:transition spd="med">
+        <p:fade/>
+      </p:transition>
+    </mc:Fallback>
+  </mc:AlternateContent>
+</p:sld>
+</file>
+
+<file path=ppt/slides/slide8.xml><?xml version="1.0" encoding="utf-8"?>
+<p:sld xmlns:a="http://schemas.openxmlformats.org/drawingml/2006/main" xmlns:r="http://schemas.openxmlformats.org/officeDocument/2006/relationships" xmlns:p="http://schemas.openxmlformats.org/presentationml/2006/main">
+  <p:cSld>
+    <p:spTree>
+      <p:nvGrpSpPr>
+        <p:cNvPr id="1" name=""/>
+        <p:cNvGrpSpPr/>
+        <p:nvPr/>
+      </p:nvGrpSpPr>
+      <p:grpSpPr>
+        <a:xfrm>
+          <a:off x="0" y="0"/>
+          <a:ext cx="0" cy="0"/>
+          <a:chOff x="0" y="0"/>
+          <a:chExt cx="0" cy="0"/>
+        </a:xfrm>
+      </p:grpSpPr>
+      <p:sp>
+        <p:nvSpPr>
+          <p:cNvPr id="2" name="Title 1">
+            <a:extLst>
+              <a:ext uri="{FF2B5EF4-FFF2-40B4-BE49-F238E27FC236}">
+                <a16:creationId xmlns:a16="http://schemas.microsoft.com/office/drawing/2014/main" id="{FE60DA79-526D-4B44-4472-17175C8E285C}"/>
+              </a:ext>
+            </a:extLst>
+          </p:cNvPr>
+          <p:cNvSpPr>
+            <a:spLocks noGrp="1"/>
+          </p:cNvSpPr>
+          <p:nvPr>
+            <p:ph type="title"/>
+          </p:nvPr>
+        </p:nvSpPr>
+        <p:spPr>
+          <a:xfrm>
+            <a:off x="481584" y="374269"/>
+            <a:ext cx="10515600" cy="1325563"/>
+          </a:xfrm>
+        </p:spPr>
+        <p:txBody>
+          <a:bodyPr/>
+          <a:lstStyle/>
+          <a:p>
+            <a:r>
+              <a:rPr lang="es-AR" b="1" dirty="0">
+                <a:solidFill>
+                  <a:schemeClr val="accent5"/>
+                </a:solidFill>
+              </a:rPr>
+              <a:t>Secretario</a:t>
+            </a:r>
+          </a:p>
+        </p:txBody>
+      </p:sp>
+      <p:sp>
+        <p:nvSpPr>
+          <p:cNvPr id="6" name="CuadroTexto 8">
+            <a:extLst>
+              <a:ext uri="{FF2B5EF4-FFF2-40B4-BE49-F238E27FC236}">
+                <a16:creationId xmlns:a16="http://schemas.microsoft.com/office/drawing/2014/main" id="{FFD943E9-C8D8-A3DA-58B0-1857813CF323}"/>
+              </a:ext>
+            </a:extLst>
+          </p:cNvPr>
+          <p:cNvSpPr txBox="1"/>
+          <p:nvPr/>
+        </p:nvSpPr>
+        <p:spPr>
+          <a:xfrm>
+            <a:off x="481584" y="1480376"/>
+            <a:ext cx="11397226" cy="2554545"/>
+          </a:xfrm>
+          <a:prstGeom prst="rect">
+            <a:avLst/>
+          </a:prstGeom>
+          <a:noFill/>
+        </p:spPr>
+        <p:txBody>
+          <a:bodyPr wrap="square" rtlCol="0">
+            <a:spAutoFit/>
+          </a:bodyPr>
+          <a:lstStyle/>
+          <a:p>
+            <a:pPr marL="457200" indent="-457200">
+              <a:lnSpc>
+                <a:spcPct val="100000"/>
+              </a:lnSpc>
+              <a:buFont typeface="Wingdings" panose="05000000000000000000" pitchFamily="2" charset="2"/>
+              <a:buChar char="q"/>
+            </a:pPr>
+            <a:r>
+              <a:rPr lang="es-MX" sz="3200" dirty="0"/>
+              <a:t>CU01 – Ver Agenda Médica</a:t>
+            </a:r>
+          </a:p>
+          <a:p>
+            <a:pPr marL="457200" indent="-457200">
+              <a:lnSpc>
+                <a:spcPct val="100000"/>
+              </a:lnSpc>
+              <a:buFont typeface="Wingdings" panose="05000000000000000000" pitchFamily="2" charset="2"/>
+              <a:buChar char="q"/>
+            </a:pPr>
+            <a:r>
+              <a:rPr lang="es-MX" sz="3200" dirty="0"/>
+              <a:t>CU02 – Registrar Pago</a:t>
+            </a:r>
+          </a:p>
+          <a:p>
+            <a:pPr marL="457200" indent="-457200">
+              <a:lnSpc>
+                <a:spcPct val="100000"/>
+              </a:lnSpc>
+              <a:buFont typeface="Wingdings" panose="05000000000000000000" pitchFamily="2" charset="2"/>
+              <a:buChar char="q"/>
+            </a:pPr>
+            <a:r>
+              <a:rPr lang="es-MX" sz="3200" dirty="0"/>
+              <a:t>CU04 – Registrar Paciente</a:t>
+            </a:r>
+          </a:p>
+          <a:p>
+            <a:pPr marL="457200" indent="-457200">
+              <a:lnSpc>
+                <a:spcPct val="100000"/>
+              </a:lnSpc>
+              <a:buFont typeface="Wingdings" panose="05000000000000000000" pitchFamily="2" charset="2"/>
+              <a:buChar char="q"/>
+            </a:pPr>
+            <a:r>
+              <a:rPr lang="es-MX" sz="3200" dirty="0"/>
+              <a:t>CU09 – Crear Turno</a:t>
+            </a:r>
+          </a:p>
+          <a:p>
+            <a:endParaRPr lang="es-AR" sz="3200" dirty="0"/>
+          </a:p>
+        </p:txBody>
+      </p:sp>
+    </p:spTree>
+    <p:extLst>
+      <p:ext uri="{BB962C8B-B14F-4D97-AF65-F5344CB8AC3E}">
+        <p14:creationId xmlns:p14="http://schemas.microsoft.com/office/powerpoint/2010/main" val="4211660537"/>
+      </p:ext>
+    </p:extLst>
+  </p:cSld>
+  <p:clrMapOvr>
+    <a:masterClrMapping/>
+  </p:clrMapOvr>
+  <mc:AlternateContent xmlns:mc="http://schemas.openxmlformats.org/markup-compatibility/2006" xmlns:p159="http://schemas.microsoft.com/office/powerpoint/2015/09/main">
+    <mc:Choice Requires="p159">
+      <p:transition spd="med">
+        <p159:morph option="byObject"/>
+      </p:transition>
+    </mc:Choice>
+    <mc:Fallback xmlns="">
+      <p:transition spd="med">
+        <p:fade/>
+      </p:transition>
+    </mc:Fallback>
+  </mc:AlternateContent>
+</p:sld>
+</file>
+
 <file path=ppt/slides/slide9.xml><?xml version="1.0" encoding="utf-8"?>
 <p:sld xmlns:a="http://schemas.openxmlformats.org/drawingml/2006/main" xmlns:r="http://schemas.openxmlformats.org/officeDocument/2006/relationships" xmlns:p="http://schemas.openxmlformats.org/presentationml/2006/main">
   <p:cSld>
@@ -16028,19 +17436,17 @@
       </p:grpSpPr>
       <p:pic>
         <p:nvPicPr>
-          <p:cNvPr id="4" name="Content Placeholder 3">
+          <p:cNvPr id="5" name="Picture 4" descr="A screenshot of a computer&#10;&#10;AI-generated content may be incorrect.">
             <a:extLst>
               <a:ext uri="{FF2B5EF4-FFF2-40B4-BE49-F238E27FC236}">
-                <a16:creationId xmlns:a16="http://schemas.microsoft.com/office/drawing/2014/main" id="{4CDCD51D-82C4-DBE7-CBF1-8E0C8CDE2CA6}"/>
+                <a16:creationId xmlns:a16="http://schemas.microsoft.com/office/drawing/2014/main" id="{19266815-81D8-88C5-C336-AC4EFF039C18}"/>
               </a:ext>
             </a:extLst>
           </p:cNvPr>
           <p:cNvPicPr>
-            <a:picLocks noGrp="1" noChangeAspect="1"/>
+            <a:picLocks noChangeAspect="1"/>
           </p:cNvPicPr>
-          <p:nvPr>
-            <p:ph idx="1"/>
-          </p:nvPr>
+          <p:nvPr/>
         </p:nvPicPr>
         <p:blipFill>
           <a:blip r:embed="rId2">
@@ -16050,72 +17456,24 @@
               </a:ext>
             </a:extLst>
           </a:blip>
-          <a:srcRect/>
           <a:stretch>
             <a:fillRect/>
           </a:stretch>
         </p:blipFill>
-        <p:spPr bwMode="auto">
+        <p:spPr>
           <a:xfrm>
-            <a:off x="1991205" y="559132"/>
-            <a:ext cx="9154850" cy="5938516"/>
+            <a:off x="0" y="1592904"/>
+            <a:ext cx="12192000" cy="3672191"/>
           </a:xfrm>
           <a:prstGeom prst="rect">
             <a:avLst/>
           </a:prstGeom>
-          <a:noFill/>
-          <a:ln>
-            <a:noFill/>
-          </a:ln>
         </p:spPr>
       </p:pic>
-      <p:sp>
-        <p:nvSpPr>
-          <p:cNvPr id="6" name="Título 1">
-            <a:extLst>
-              <a:ext uri="{FF2B5EF4-FFF2-40B4-BE49-F238E27FC236}">
-                <a16:creationId xmlns:a16="http://schemas.microsoft.com/office/drawing/2014/main" id="{1E36BF5B-6D64-6ED8-E7F3-840766302043}"/>
-              </a:ext>
-            </a:extLst>
-          </p:cNvPr>
-          <p:cNvSpPr>
-            <a:spLocks noGrp="1"/>
-          </p:cNvSpPr>
-          <p:nvPr>
-            <p:ph type="title"/>
-          </p:nvPr>
-        </p:nvSpPr>
-        <p:spPr>
-          <a:xfrm>
-            <a:off x="269405" y="360352"/>
-            <a:ext cx="3276600" cy="1325563"/>
-          </a:xfrm>
-        </p:spPr>
-        <p:txBody>
-          <a:bodyPr/>
-          <a:lstStyle/>
-          <a:p>
-            <a:pPr algn="ctr"/>
-            <a:r>
-              <a:rPr lang="es-MX" b="1" dirty="0">
-                <a:solidFill>
-                  <a:schemeClr val="accent5"/>
-                </a:solidFill>
-              </a:rPr>
-              <a:t>Secretario</a:t>
-            </a:r>
-            <a:endParaRPr lang="es-AR" b="1" dirty="0">
-              <a:solidFill>
-                <a:schemeClr val="accent5"/>
-              </a:solidFill>
-            </a:endParaRPr>
-          </a:p>
-        </p:txBody>
-      </p:sp>
     </p:spTree>
     <p:extLst>
       <p:ext uri="{BB962C8B-B14F-4D97-AF65-F5344CB8AC3E}">
-        <p14:creationId xmlns:p14="http://schemas.microsoft.com/office/powerpoint/2010/main" val="1560920494"/>
+        <p14:creationId xmlns:p14="http://schemas.microsoft.com/office/powerpoint/2010/main" val="584145593"/>
       </p:ext>
     </p:extLst>
   </p:cSld>

</xml_diff>

<commit_message>
Cambio de orden diapositivas
</commit_message>
<xml_diff>
--- a/Documentos/Presentacion2 - S.G.A.P.pptx
+++ b/Documentos/Presentacion2 - S.G.A.P.pptx
@@ -18,10 +18,10 @@
     <p:sldId id="305" r:id="rId9"/>
     <p:sldId id="322" r:id="rId10"/>
     <p:sldId id="321" r:id="rId11"/>
-    <p:sldId id="323" r:id="rId12"/>
-    <p:sldId id="324" r:id="rId13"/>
-    <p:sldId id="325" r:id="rId14"/>
-    <p:sldId id="326" r:id="rId15"/>
+    <p:sldId id="324" r:id="rId12"/>
+    <p:sldId id="325" r:id="rId13"/>
+    <p:sldId id="326" r:id="rId14"/>
+    <p:sldId id="323" r:id="rId15"/>
     <p:sldId id="308" r:id="rId16"/>
     <p:sldId id="327" r:id="rId17"/>
     <p:sldId id="328" r:id="rId18"/>
@@ -233,7 +233,7 @@
           <a:p>
             <a:fld id="{629A1E81-153C-40F7-A83A-EFADE537F3C0}" type="datetimeFigureOut">
               <a:rPr lang="es-AR" smtClean="0"/>
-              <a:t>28/7/2025</a:t>
+              <a:t>4/8/2025</a:t>
             </a:fld>
             <a:endParaRPr lang="es-AR"/>
           </a:p>
@@ -734,7 +734,7 @@
           <a:p>
             <a:fld id="{58B39602-C7D4-4829-B195-DFE604AA5466}" type="datetimeFigureOut">
               <a:rPr lang="es-AR" smtClean="0"/>
-              <a:t>28/7/2025</a:t>
+              <a:t>4/8/2025</a:t>
             </a:fld>
             <a:endParaRPr lang="es-AR"/>
           </a:p>
@@ -946,7 +946,7 @@
           <a:p>
             <a:fld id="{58B39602-C7D4-4829-B195-DFE604AA5466}" type="datetimeFigureOut">
               <a:rPr lang="es-AR" smtClean="0"/>
-              <a:t>28/7/2025</a:t>
+              <a:t>4/8/2025</a:t>
             </a:fld>
             <a:endParaRPr lang="es-AR"/>
           </a:p>
@@ -1168,7 +1168,7 @@
           <a:p>
             <a:fld id="{58B39602-C7D4-4829-B195-DFE604AA5466}" type="datetimeFigureOut">
               <a:rPr lang="es-AR" smtClean="0"/>
-              <a:t>28/7/2025</a:t>
+              <a:t>4/8/2025</a:t>
             </a:fld>
             <a:endParaRPr lang="es-AR"/>
           </a:p>
@@ -1380,7 +1380,7 @@
           <a:p>
             <a:fld id="{58B39602-C7D4-4829-B195-DFE604AA5466}" type="datetimeFigureOut">
               <a:rPr lang="es-AR" smtClean="0"/>
-              <a:t>28/7/2025</a:t>
+              <a:t>4/8/2025</a:t>
             </a:fld>
             <a:endParaRPr lang="es-AR"/>
           </a:p>
@@ -1668,7 +1668,7 @@
           <a:p>
             <a:fld id="{58B39602-C7D4-4829-B195-DFE604AA5466}" type="datetimeFigureOut">
               <a:rPr lang="es-AR" smtClean="0"/>
-              <a:t>28/7/2025</a:t>
+              <a:t>4/8/2025</a:t>
             </a:fld>
             <a:endParaRPr lang="es-AR"/>
           </a:p>
@@ -1948,7 +1948,7 @@
           <a:p>
             <a:fld id="{58B39602-C7D4-4829-B195-DFE604AA5466}" type="datetimeFigureOut">
               <a:rPr lang="es-AR" smtClean="0"/>
-              <a:t>28/7/2025</a:t>
+              <a:t>4/8/2025</a:t>
             </a:fld>
             <a:endParaRPr lang="es-AR"/>
           </a:p>
@@ -2375,7 +2375,7 @@
           <a:p>
             <a:fld id="{58B39602-C7D4-4829-B195-DFE604AA5466}" type="datetimeFigureOut">
               <a:rPr lang="es-AR" smtClean="0"/>
-              <a:t>28/7/2025</a:t>
+              <a:t>4/8/2025</a:t>
             </a:fld>
             <a:endParaRPr lang="es-AR"/>
           </a:p>
@@ -2529,7 +2529,7 @@
           <a:p>
             <a:fld id="{58B39602-C7D4-4829-B195-DFE604AA5466}" type="datetimeFigureOut">
               <a:rPr lang="es-AR" smtClean="0"/>
-              <a:t>28/7/2025</a:t>
+              <a:t>4/8/2025</a:t>
             </a:fld>
             <a:endParaRPr lang="es-AR"/>
           </a:p>
@@ -2654,7 +2654,7 @@
           <a:p>
             <a:fld id="{58B39602-C7D4-4829-B195-DFE604AA5466}" type="datetimeFigureOut">
               <a:rPr lang="es-AR" smtClean="0"/>
-              <a:t>28/7/2025</a:t>
+              <a:t>4/8/2025</a:t>
             </a:fld>
             <a:endParaRPr lang="es-AR"/>
           </a:p>
@@ -2979,7 +2979,7 @@
           <a:p>
             <a:fld id="{58B39602-C7D4-4829-B195-DFE604AA5466}" type="datetimeFigureOut">
               <a:rPr lang="es-AR" smtClean="0"/>
-              <a:t>28/7/2025</a:t>
+              <a:t>4/8/2025</a:t>
             </a:fld>
             <a:endParaRPr lang="es-AR"/>
           </a:p>
@@ -3280,7 +3280,7 @@
           <a:p>
             <a:fld id="{58B39602-C7D4-4829-B195-DFE604AA5466}" type="datetimeFigureOut">
               <a:rPr lang="es-AR" smtClean="0"/>
-              <a:t>28/7/2025</a:t>
+              <a:t>4/8/2025</a:t>
             </a:fld>
             <a:endParaRPr lang="es-AR"/>
           </a:p>
@@ -3535,7 +3535,7 @@
           <a:p>
             <a:fld id="{58B39602-C7D4-4829-B195-DFE604AA5466}" type="datetimeFigureOut">
               <a:rPr lang="es-AR" smtClean="0"/>
-              <a:t>28/7/2025</a:t>
+              <a:t>4/8/2025</a:t>
             </a:fld>
             <a:endParaRPr lang="es-AR"/>
           </a:p>
@@ -13563,84 +13563,6 @@
       </p:grpSpPr>
       <p:pic>
         <p:nvPicPr>
-          <p:cNvPr id="5" name="Picture 4" descr="A screenshot of a phone&#10;&#10;AI-generated content may be incorrect.">
-            <a:extLst>
-              <a:ext uri="{FF2B5EF4-FFF2-40B4-BE49-F238E27FC236}">
-                <a16:creationId xmlns:a16="http://schemas.microsoft.com/office/drawing/2014/main" id="{584F6D9A-1162-74A2-A537-08E5AEE0AC20}"/>
-              </a:ext>
-            </a:extLst>
-          </p:cNvPr>
-          <p:cNvPicPr>
-            <a:picLocks noChangeAspect="1"/>
-          </p:cNvPicPr>
-          <p:nvPr/>
-        </p:nvPicPr>
-        <p:blipFill>
-          <a:blip r:embed="rId2">
-            <a:extLst>
-              <a:ext uri="{28A0092B-C50C-407E-A947-70E740481C1C}">
-                <a14:useLocalDpi xmlns:a14="http://schemas.microsoft.com/office/drawing/2010/main" val="0"/>
-              </a:ext>
-            </a:extLst>
-          </a:blip>
-          <a:stretch>
-            <a:fillRect/>
-          </a:stretch>
-        </p:blipFill>
-        <p:spPr>
-          <a:xfrm>
-            <a:off x="3473115" y="133770"/>
-            <a:ext cx="5245769" cy="6590459"/>
-          </a:xfrm>
-          <a:prstGeom prst="rect">
-            <a:avLst/>
-          </a:prstGeom>
-        </p:spPr>
-      </p:pic>
-    </p:spTree>
-    <p:extLst>
-      <p:ext uri="{BB962C8B-B14F-4D97-AF65-F5344CB8AC3E}">
-        <p14:creationId xmlns:p14="http://schemas.microsoft.com/office/powerpoint/2010/main" val="3820961138"/>
-      </p:ext>
-    </p:extLst>
-  </p:cSld>
-  <p:clrMapOvr>
-    <a:masterClrMapping/>
-  </p:clrMapOvr>
-  <mc:AlternateContent xmlns:mc="http://schemas.openxmlformats.org/markup-compatibility/2006" xmlns:p159="http://schemas.microsoft.com/office/powerpoint/2015/09/main">
-    <mc:Choice Requires="p159">
-      <p:transition spd="med">
-        <p159:morph option="byObject"/>
-      </p:transition>
-    </mc:Choice>
-    <mc:Fallback xmlns="">
-      <p:transition spd="med">
-        <p:fade/>
-      </p:transition>
-    </mc:Fallback>
-  </mc:AlternateContent>
-</p:sld>
-</file>
-
-<file path=ppt/slides/slide12.xml><?xml version="1.0" encoding="utf-8"?>
-<p:sld xmlns:a="http://schemas.openxmlformats.org/drawingml/2006/main" xmlns:r="http://schemas.openxmlformats.org/officeDocument/2006/relationships" xmlns:p="http://schemas.openxmlformats.org/presentationml/2006/main">
-  <p:cSld>
-    <p:spTree>
-      <p:nvGrpSpPr>
-        <p:cNvPr id="1" name=""/>
-        <p:cNvGrpSpPr/>
-        <p:nvPr/>
-      </p:nvGrpSpPr>
-      <p:grpSpPr>
-        <a:xfrm>
-          <a:off x="0" y="0"/>
-          <a:ext cx="0" cy="0"/>
-          <a:chOff x="0" y="0"/>
-          <a:chExt cx="0" cy="0"/>
-        </a:xfrm>
-      </p:grpSpPr>
-      <p:pic>
-        <p:nvPicPr>
           <p:cNvPr id="5" name="Picture 4" descr="A screenshot of a computer&#10;&#10;AI-generated content may be incorrect.">
             <a:extLst>
               <a:ext uri="{FF2B5EF4-FFF2-40B4-BE49-F238E27FC236}">
@@ -13700,7 +13622,7 @@
 </p:sld>
 </file>
 
-<file path=ppt/slides/slide13.xml><?xml version="1.0" encoding="utf-8"?>
+<file path=ppt/slides/slide12.xml><?xml version="1.0" encoding="utf-8"?>
 <p:sld xmlns:a="http://schemas.openxmlformats.org/drawingml/2006/main" xmlns:r="http://schemas.openxmlformats.org/officeDocument/2006/relationships" xmlns:p="http://schemas.openxmlformats.org/presentationml/2006/main">
   <p:cSld>
     <p:spTree>
@@ -13778,7 +13700,7 @@
 </p:sld>
 </file>
 
-<file path=ppt/slides/slide14.xml><?xml version="1.0" encoding="utf-8"?>
+<file path=ppt/slides/slide13.xml><?xml version="1.0" encoding="utf-8"?>
 <p:sld xmlns:a="http://schemas.openxmlformats.org/drawingml/2006/main" xmlns:r="http://schemas.openxmlformats.org/officeDocument/2006/relationships" xmlns:p="http://schemas.openxmlformats.org/presentationml/2006/main">
   <p:cSld>
     <p:spTree>
@@ -13835,6 +13757,84 @@
     <p:extLst>
       <p:ext uri="{BB962C8B-B14F-4D97-AF65-F5344CB8AC3E}">
         <p14:creationId xmlns:p14="http://schemas.microsoft.com/office/powerpoint/2010/main" val="1048911121"/>
+      </p:ext>
+    </p:extLst>
+  </p:cSld>
+  <p:clrMapOvr>
+    <a:masterClrMapping/>
+  </p:clrMapOvr>
+  <mc:AlternateContent xmlns:mc="http://schemas.openxmlformats.org/markup-compatibility/2006" xmlns:p159="http://schemas.microsoft.com/office/powerpoint/2015/09/main">
+    <mc:Choice Requires="p159">
+      <p:transition spd="med">
+        <p159:morph option="byObject"/>
+      </p:transition>
+    </mc:Choice>
+    <mc:Fallback xmlns="">
+      <p:transition spd="med">
+        <p:fade/>
+      </p:transition>
+    </mc:Fallback>
+  </mc:AlternateContent>
+</p:sld>
+</file>
+
+<file path=ppt/slides/slide14.xml><?xml version="1.0" encoding="utf-8"?>
+<p:sld xmlns:a="http://schemas.openxmlformats.org/drawingml/2006/main" xmlns:r="http://schemas.openxmlformats.org/officeDocument/2006/relationships" xmlns:p="http://schemas.openxmlformats.org/presentationml/2006/main">
+  <p:cSld>
+    <p:spTree>
+      <p:nvGrpSpPr>
+        <p:cNvPr id="1" name=""/>
+        <p:cNvGrpSpPr/>
+        <p:nvPr/>
+      </p:nvGrpSpPr>
+      <p:grpSpPr>
+        <a:xfrm>
+          <a:off x="0" y="0"/>
+          <a:ext cx="0" cy="0"/>
+          <a:chOff x="0" y="0"/>
+          <a:chExt cx="0" cy="0"/>
+        </a:xfrm>
+      </p:grpSpPr>
+      <p:pic>
+        <p:nvPicPr>
+          <p:cNvPr id="5" name="Picture 4" descr="A screenshot of a phone&#10;&#10;AI-generated content may be incorrect.">
+            <a:extLst>
+              <a:ext uri="{FF2B5EF4-FFF2-40B4-BE49-F238E27FC236}">
+                <a16:creationId xmlns:a16="http://schemas.microsoft.com/office/drawing/2014/main" id="{584F6D9A-1162-74A2-A537-08E5AEE0AC20}"/>
+              </a:ext>
+            </a:extLst>
+          </p:cNvPr>
+          <p:cNvPicPr>
+            <a:picLocks noChangeAspect="1"/>
+          </p:cNvPicPr>
+          <p:nvPr/>
+        </p:nvPicPr>
+        <p:blipFill>
+          <a:blip r:embed="rId2">
+            <a:extLst>
+              <a:ext uri="{28A0092B-C50C-407E-A947-70E740481C1C}">
+                <a14:useLocalDpi xmlns:a14="http://schemas.microsoft.com/office/drawing/2010/main" val="0"/>
+              </a:ext>
+            </a:extLst>
+          </a:blip>
+          <a:stretch>
+            <a:fillRect/>
+          </a:stretch>
+        </p:blipFill>
+        <p:spPr>
+          <a:xfrm>
+            <a:off x="3473115" y="133770"/>
+            <a:ext cx="5245769" cy="6590459"/>
+          </a:xfrm>
+          <a:prstGeom prst="rect">
+            <a:avLst/>
+          </a:prstGeom>
+        </p:spPr>
+      </p:pic>
+    </p:spTree>
+    <p:extLst>
+      <p:ext uri="{BB962C8B-B14F-4D97-AF65-F5344CB8AC3E}">
+        <p14:creationId xmlns:p14="http://schemas.microsoft.com/office/powerpoint/2010/main" val="3820961138"/>
       </p:ext>
     </p:extLst>
   </p:cSld>

</xml_diff>

<commit_message>
Cambios en diagramas CU en doc principal y presentacion2
</commit_message>
<xml_diff>
--- a/Documentos/Presentacion2 - S.G.A.P.pptx
+++ b/Documentos/Presentacion2 - S.G.A.P.pptx
@@ -233,7 +233,7 @@
           <a:p>
             <a:fld id="{629A1E81-153C-40F7-A83A-EFADE537F3C0}" type="datetimeFigureOut">
               <a:rPr lang="es-AR" smtClean="0"/>
-              <a:t>4/8/2025</a:t>
+              <a:t>5/8/2025</a:t>
             </a:fld>
             <a:endParaRPr lang="es-AR"/>
           </a:p>
@@ -734,7 +734,7 @@
           <a:p>
             <a:fld id="{58B39602-C7D4-4829-B195-DFE604AA5466}" type="datetimeFigureOut">
               <a:rPr lang="es-AR" smtClean="0"/>
-              <a:t>4/8/2025</a:t>
+              <a:t>5/8/2025</a:t>
             </a:fld>
             <a:endParaRPr lang="es-AR"/>
           </a:p>
@@ -946,7 +946,7 @@
           <a:p>
             <a:fld id="{58B39602-C7D4-4829-B195-DFE604AA5466}" type="datetimeFigureOut">
               <a:rPr lang="es-AR" smtClean="0"/>
-              <a:t>4/8/2025</a:t>
+              <a:t>5/8/2025</a:t>
             </a:fld>
             <a:endParaRPr lang="es-AR"/>
           </a:p>
@@ -1168,7 +1168,7 @@
           <a:p>
             <a:fld id="{58B39602-C7D4-4829-B195-DFE604AA5466}" type="datetimeFigureOut">
               <a:rPr lang="es-AR" smtClean="0"/>
-              <a:t>4/8/2025</a:t>
+              <a:t>5/8/2025</a:t>
             </a:fld>
             <a:endParaRPr lang="es-AR"/>
           </a:p>
@@ -1380,7 +1380,7 @@
           <a:p>
             <a:fld id="{58B39602-C7D4-4829-B195-DFE604AA5466}" type="datetimeFigureOut">
               <a:rPr lang="es-AR" smtClean="0"/>
-              <a:t>4/8/2025</a:t>
+              <a:t>5/8/2025</a:t>
             </a:fld>
             <a:endParaRPr lang="es-AR"/>
           </a:p>
@@ -1668,7 +1668,7 @@
           <a:p>
             <a:fld id="{58B39602-C7D4-4829-B195-DFE604AA5466}" type="datetimeFigureOut">
               <a:rPr lang="es-AR" smtClean="0"/>
-              <a:t>4/8/2025</a:t>
+              <a:t>5/8/2025</a:t>
             </a:fld>
             <a:endParaRPr lang="es-AR"/>
           </a:p>
@@ -1948,7 +1948,7 @@
           <a:p>
             <a:fld id="{58B39602-C7D4-4829-B195-DFE604AA5466}" type="datetimeFigureOut">
               <a:rPr lang="es-AR" smtClean="0"/>
-              <a:t>4/8/2025</a:t>
+              <a:t>5/8/2025</a:t>
             </a:fld>
             <a:endParaRPr lang="es-AR"/>
           </a:p>
@@ -2375,7 +2375,7 @@
           <a:p>
             <a:fld id="{58B39602-C7D4-4829-B195-DFE604AA5466}" type="datetimeFigureOut">
               <a:rPr lang="es-AR" smtClean="0"/>
-              <a:t>4/8/2025</a:t>
+              <a:t>5/8/2025</a:t>
             </a:fld>
             <a:endParaRPr lang="es-AR"/>
           </a:p>
@@ -2529,7 +2529,7 @@
           <a:p>
             <a:fld id="{58B39602-C7D4-4829-B195-DFE604AA5466}" type="datetimeFigureOut">
               <a:rPr lang="es-AR" smtClean="0"/>
-              <a:t>4/8/2025</a:t>
+              <a:t>5/8/2025</a:t>
             </a:fld>
             <a:endParaRPr lang="es-AR"/>
           </a:p>
@@ -2654,7 +2654,7 @@
           <a:p>
             <a:fld id="{58B39602-C7D4-4829-B195-DFE604AA5466}" type="datetimeFigureOut">
               <a:rPr lang="es-AR" smtClean="0"/>
-              <a:t>4/8/2025</a:t>
+              <a:t>5/8/2025</a:t>
             </a:fld>
             <a:endParaRPr lang="es-AR"/>
           </a:p>
@@ -2979,7 +2979,7 @@
           <a:p>
             <a:fld id="{58B39602-C7D4-4829-B195-DFE604AA5466}" type="datetimeFigureOut">
               <a:rPr lang="es-AR" smtClean="0"/>
-              <a:t>4/8/2025</a:t>
+              <a:t>5/8/2025</a:t>
             </a:fld>
             <a:endParaRPr lang="es-AR"/>
           </a:p>
@@ -3280,7 +3280,7 @@
           <a:p>
             <a:fld id="{58B39602-C7D4-4829-B195-DFE604AA5466}" type="datetimeFigureOut">
               <a:rPr lang="es-AR" smtClean="0"/>
-              <a:t>4/8/2025</a:t>
+              <a:t>5/8/2025</a:t>
             </a:fld>
             <a:endParaRPr lang="es-AR"/>
           </a:p>
@@ -3535,7 +3535,7 @@
           <a:p>
             <a:fld id="{58B39602-C7D4-4829-B195-DFE604AA5466}" type="datetimeFigureOut">
               <a:rPr lang="es-AR" smtClean="0"/>
-              <a:t>4/8/2025</a:t>
+              <a:t>5/8/2025</a:t>
             </a:fld>
             <a:endParaRPr lang="es-AR"/>
           </a:p>
@@ -14521,7 +14521,7 @@
         <p:spPr>
           <a:xfrm>
             <a:off x="206478" y="3028877"/>
-            <a:ext cx="12192000" cy="3639129"/>
+            <a:ext cx="11985522" cy="3639129"/>
           </a:xfrm>
           <a:prstGeom prst="rect">
             <a:avLst/>
@@ -14752,7 +14752,7 @@
             </a:r>
             <a:r>
               <a:rPr lang="es-ES" dirty="0"/>
-              <a:t>Los pacientes solo podrán obtener un turno con un profesional tanto de manera presencial como remota.</a:t>
+              <a:t>Los pacientes podrán obtener un turno con un profesional tanto de manera presencial como remota.</a:t>
             </a:r>
             <a:endParaRPr lang="es-AR" dirty="0"/>
           </a:p>
@@ -16766,19 +16766,17 @@
       </p:grpSpPr>
       <p:pic>
         <p:nvPicPr>
-          <p:cNvPr id="4" name="Content Placeholder 3">
+          <p:cNvPr id="5" name="Picture 4" descr="A diagram of a medical procedure&#10;&#10;AI-generated content may be incorrect.">
             <a:extLst>
               <a:ext uri="{FF2B5EF4-FFF2-40B4-BE49-F238E27FC236}">
-                <a16:creationId xmlns:a16="http://schemas.microsoft.com/office/drawing/2014/main" id="{4CDCD51D-82C4-DBE7-CBF1-8E0C8CDE2CA6}"/>
+                <a16:creationId xmlns:a16="http://schemas.microsoft.com/office/drawing/2014/main" id="{12974A27-FDCF-C636-FDC4-41910E430F96}"/>
               </a:ext>
             </a:extLst>
           </p:cNvPr>
           <p:cNvPicPr>
-            <a:picLocks noGrp="1" noChangeAspect="1"/>
+            <a:picLocks noChangeAspect="1"/>
           </p:cNvPicPr>
-          <p:nvPr>
-            <p:ph idx="1"/>
-          </p:nvPr>
+          <p:nvPr/>
         </p:nvPicPr>
         <p:blipFill>
           <a:blip r:embed="rId2">
@@ -16795,8 +16793,8 @@
         </p:blipFill>
         <p:spPr bwMode="auto">
           <a:xfrm>
-            <a:off x="1991205" y="559132"/>
-            <a:ext cx="9154850" cy="5938516"/>
+            <a:off x="2072205" y="166701"/>
+            <a:ext cx="8047589" cy="6330947"/>
           </a:xfrm>
           <a:prstGeom prst="rect">
             <a:avLst/>
@@ -16932,10 +16930,10 @@
       </p:sp>
       <p:pic>
         <p:nvPicPr>
-          <p:cNvPr id="4" name="Picture 3" descr="A diagram of a medical procedure&#10;&#10;AI-generated content may be incorrect.">
+          <p:cNvPr id="3" name="Picture 2" descr="A diagram of a medical procedure&#10;&#10;AI-generated content may be incorrect.">
             <a:extLst>
               <a:ext uri="{FF2B5EF4-FFF2-40B4-BE49-F238E27FC236}">
-                <a16:creationId xmlns:a16="http://schemas.microsoft.com/office/drawing/2014/main" id="{C2AB8376-225A-F9CE-30CB-5931169FA4FE}"/>
+                <a16:creationId xmlns:a16="http://schemas.microsoft.com/office/drawing/2014/main" id="{AF595165-11CC-F91B-34C5-88E1B8C7F012}"/>
               </a:ext>
             </a:extLst>
           </p:cNvPr>
@@ -16952,23 +16950,18 @@
               </a:ext>
             </a:extLst>
           </a:blip>
-          <a:srcRect/>
           <a:stretch>
             <a:fillRect/>
           </a:stretch>
         </p:blipFill>
-        <p:spPr bwMode="auto">
+        <p:spPr>
           <a:xfrm>
-            <a:off x="3546005" y="367150"/>
-            <a:ext cx="5934879" cy="6130498"/>
+            <a:off x="3546005" y="292335"/>
+            <a:ext cx="6073541" cy="6273329"/>
           </a:xfrm>
           <a:prstGeom prst="rect">
             <a:avLst/>
           </a:prstGeom>
-          <a:noFill/>
-          <a:ln>
-            <a:noFill/>
-          </a:ln>
         </p:spPr>
       </p:pic>
     </p:spTree>

</xml_diff>